<commit_message>
just doing some updates
</commit_message>
<xml_diff>
--- a/PresentationTemplate.pptx
+++ b/PresentationTemplate.pptx
@@ -2,7 +2,7 @@
 <file path=ppt/presentation.xml><?xml version="1.0" encoding="utf-8"?>
 <p:presentation xmlns:a="http://schemas.openxmlformats.org/drawingml/2006/main" xmlns:r="http://schemas.openxmlformats.org/officeDocument/2006/relationships" xmlns:p="http://schemas.openxmlformats.org/presentationml/2006/main" saveSubsetFonts="1">
   <p:sldMasterIdLst>
-    <p:sldMasterId id="2147483660" r:id="rId1"/>
+    <p:sldMasterId id="2147483672" r:id="rId1"/>
   </p:sldMasterIdLst>
   <p:sldIdLst>
     <p:sldId id="256" r:id="rId2"/>
@@ -25,7 +25,7 @@
     <a:defPPr>
       <a:defRPr lang="en-US"/>
     </a:defPPr>
-    <a:lvl1pPr marL="0" algn="l" defTabSz="457200" rtl="0" eaLnBrk="1" latinLnBrk="0" hangingPunct="1">
+    <a:lvl1pPr marL="0" algn="l" defTabSz="914400" rtl="0" eaLnBrk="1" latinLnBrk="0" hangingPunct="1">
       <a:defRPr sz="1800" kern="1200">
         <a:solidFill>
           <a:schemeClr val="tx1"/>
@@ -35,7 +35,7 @@
         <a:cs typeface="+mn-cs"/>
       </a:defRPr>
     </a:lvl1pPr>
-    <a:lvl2pPr marL="457200" algn="l" defTabSz="457200" rtl="0" eaLnBrk="1" latinLnBrk="0" hangingPunct="1">
+    <a:lvl2pPr marL="457200" algn="l" defTabSz="914400" rtl="0" eaLnBrk="1" latinLnBrk="0" hangingPunct="1">
       <a:defRPr sz="1800" kern="1200">
         <a:solidFill>
           <a:schemeClr val="tx1"/>
@@ -45,7 +45,7 @@
         <a:cs typeface="+mn-cs"/>
       </a:defRPr>
     </a:lvl2pPr>
-    <a:lvl3pPr marL="914400" algn="l" defTabSz="457200" rtl="0" eaLnBrk="1" latinLnBrk="0" hangingPunct="1">
+    <a:lvl3pPr marL="914400" algn="l" defTabSz="914400" rtl="0" eaLnBrk="1" latinLnBrk="0" hangingPunct="1">
       <a:defRPr sz="1800" kern="1200">
         <a:solidFill>
           <a:schemeClr val="tx1"/>
@@ -55,7 +55,7 @@
         <a:cs typeface="+mn-cs"/>
       </a:defRPr>
     </a:lvl3pPr>
-    <a:lvl4pPr marL="1371600" algn="l" defTabSz="457200" rtl="0" eaLnBrk="1" latinLnBrk="0" hangingPunct="1">
+    <a:lvl4pPr marL="1371600" algn="l" defTabSz="914400" rtl="0" eaLnBrk="1" latinLnBrk="0" hangingPunct="1">
       <a:defRPr sz="1800" kern="1200">
         <a:solidFill>
           <a:schemeClr val="tx1"/>
@@ -65,7 +65,7 @@
         <a:cs typeface="+mn-cs"/>
       </a:defRPr>
     </a:lvl4pPr>
-    <a:lvl5pPr marL="1828800" algn="l" defTabSz="457200" rtl="0" eaLnBrk="1" latinLnBrk="0" hangingPunct="1">
+    <a:lvl5pPr marL="1828800" algn="l" defTabSz="914400" rtl="0" eaLnBrk="1" latinLnBrk="0" hangingPunct="1">
       <a:defRPr sz="1800" kern="1200">
         <a:solidFill>
           <a:schemeClr val="tx1"/>
@@ -75,7 +75,7 @@
         <a:cs typeface="+mn-cs"/>
       </a:defRPr>
     </a:lvl5pPr>
-    <a:lvl6pPr marL="2286000" algn="l" defTabSz="457200" rtl="0" eaLnBrk="1" latinLnBrk="0" hangingPunct="1">
+    <a:lvl6pPr marL="2286000" algn="l" defTabSz="914400" rtl="0" eaLnBrk="1" latinLnBrk="0" hangingPunct="1">
       <a:defRPr sz="1800" kern="1200">
         <a:solidFill>
           <a:schemeClr val="tx1"/>
@@ -85,7 +85,7 @@
         <a:cs typeface="+mn-cs"/>
       </a:defRPr>
     </a:lvl6pPr>
-    <a:lvl7pPr marL="2743200" algn="l" defTabSz="457200" rtl="0" eaLnBrk="1" latinLnBrk="0" hangingPunct="1">
+    <a:lvl7pPr marL="2743200" algn="l" defTabSz="914400" rtl="0" eaLnBrk="1" latinLnBrk="0" hangingPunct="1">
       <a:defRPr sz="1800" kern="1200">
         <a:solidFill>
           <a:schemeClr val="tx1"/>
@@ -95,7 +95,7 @@
         <a:cs typeface="+mn-cs"/>
       </a:defRPr>
     </a:lvl7pPr>
-    <a:lvl8pPr marL="3200400" algn="l" defTabSz="457200" rtl="0" eaLnBrk="1" latinLnBrk="0" hangingPunct="1">
+    <a:lvl8pPr marL="3200400" algn="l" defTabSz="914400" rtl="0" eaLnBrk="1" latinLnBrk="0" hangingPunct="1">
       <a:defRPr sz="1800" kern="1200">
         <a:solidFill>
           <a:schemeClr val="tx1"/>
@@ -105,7 +105,7 @@
         <a:cs typeface="+mn-cs"/>
       </a:defRPr>
     </a:lvl8pPr>
-    <a:lvl9pPr marL="3657600" algn="l" defTabSz="457200" rtl="0" eaLnBrk="1" latinLnBrk="0" hangingPunct="1">
+    <a:lvl9pPr marL="3657600" algn="l" defTabSz="914400" rtl="0" eaLnBrk="1" latinLnBrk="0" hangingPunct="1">
       <a:defRPr sz="1800" kern="1200">
         <a:solidFill>
           <a:schemeClr val="tx1"/>
@@ -116,20 +116,17 @@
       </a:defRPr>
     </a:lvl9pPr>
   </p:defaultTextStyle>
+  <p:extLst>
+    <p:ext uri="{EFAFB233-063F-42B5-8137-9DF3F51BA10A}">
+      <p15:sldGuideLst xmlns:p15="http://schemas.microsoft.com/office/powerpoint/2012/main"/>
+    </p:ext>
+  </p:extLst>
 </p:presentation>
 </file>
 
 <file path=ppt/slideLayouts/slideLayout1.xml><?xml version="1.0" encoding="utf-8"?>
 <p:sldLayout xmlns:a="http://schemas.openxmlformats.org/drawingml/2006/main" xmlns:r="http://schemas.openxmlformats.org/officeDocument/2006/relationships" xmlns:p="http://schemas.openxmlformats.org/presentationml/2006/main" type="title" preserve="1">
   <p:cSld name="Title Slide">
-    <p:bg>
-      <p:bgPr>
-        <a:solidFill>
-          <a:schemeClr val="accent2"/>
-        </a:solidFill>
-        <a:effectLst/>
-      </p:bgPr>
-    </p:bg>
     <p:spTree>
       <p:nvGrpSpPr>
         <p:cNvPr id="1" name=""/>
@@ -146,7 +143,13 @@
       </p:grpSpPr>
       <p:sp>
         <p:nvSpPr>
-          <p:cNvPr id="2" name="Title 1"/>
+          <p:cNvPr id="2" name="Title 1">
+            <a:extLst>
+              <a:ext uri="{FF2B5EF4-FFF2-40B4-BE49-F238E27FC236}">
+                <a16:creationId xmlns:a16="http://schemas.microsoft.com/office/drawing/2014/main" id="{F8458276-0974-4484-AFBA-DD9532B5D977}"/>
+              </a:ext>
+            </a:extLst>
+          </p:cNvPr>
           <p:cNvSpPr>
             <a:spLocks noGrp="1"/>
           </p:cNvSpPr>
@@ -154,31 +157,17 @@
             <p:ph type="ctrTitle"/>
           </p:nvPr>
         </p:nvSpPr>
-        <p:spPr bwMode="blackWhite">
+        <p:spPr>
           <a:xfrm>
-            <a:off x="1600200" y="2386744"/>
-            <a:ext cx="8991600" cy="1645920"/>
+            <a:off x="1524000" y="1122363"/>
+            <a:ext cx="9144000" cy="2387600"/>
           </a:xfrm>
-          <a:solidFill>
-            <a:srgbClr val="FFFFFF"/>
-          </a:solidFill>
-          <a:ln w="38100">
-            <a:solidFill>
-              <a:srgbClr val="404040"/>
-            </a:solidFill>
-          </a:ln>
         </p:spPr>
         <p:txBody>
-          <a:bodyPr lIns="274320" rIns="274320" anchor="ctr" anchorCtr="1">
-            <a:normAutofit/>
-          </a:bodyPr>
+          <a:bodyPr anchor="b"/>
           <a:lstStyle>
             <a:lvl1pPr algn="ctr">
-              <a:defRPr sz="3800">
-                <a:solidFill>
-                  <a:srgbClr val="262626"/>
-                </a:solidFill>
-              </a:defRPr>
+              <a:defRPr sz="6000"/>
             </a:lvl1pPr>
           </a:lstStyle>
           <a:p>
@@ -186,13 +175,18 @@
               <a:rPr lang="en-US"/>
               <a:t>Click to edit Master title style</a:t>
             </a:r>
-            <a:endParaRPr lang="en-US" dirty="0"/>
-          </a:p>
-        </p:txBody>
-      </p:sp>
-      <p:sp>
-        <p:nvSpPr>
-          <p:cNvPr id="3" name="Subtitle 2"/>
+          </a:p>
+        </p:txBody>
+      </p:sp>
+      <p:sp>
+        <p:nvSpPr>
+          <p:cNvPr id="3" name="Subtitle 2">
+            <a:extLst>
+              <a:ext uri="{FF2B5EF4-FFF2-40B4-BE49-F238E27FC236}">
+                <a16:creationId xmlns:a16="http://schemas.microsoft.com/office/drawing/2014/main" id="{85673C6C-DEC2-4982-89B3-8B16F25B577F}"/>
+              </a:ext>
+            </a:extLst>
+          </p:cNvPr>
           <p:cNvSpPr>
             <a:spLocks noGrp="1"/>
           </p:cNvSpPr>
@@ -202,26 +196,16 @@
         </p:nvSpPr>
         <p:spPr>
           <a:xfrm>
-            <a:off x="2695194" y="4352544"/>
-            <a:ext cx="6801612" cy="1239894"/>
+            <a:off x="1524000" y="3602038"/>
+            <a:ext cx="9144000" cy="1655762"/>
           </a:xfrm>
-          <a:noFill/>
         </p:spPr>
         <p:txBody>
-          <a:bodyPr>
-            <a:normAutofit/>
-          </a:bodyPr>
+          <a:bodyPr/>
           <a:lstStyle>
             <a:lvl1pPr marL="0" indent="0" algn="ctr">
               <a:buNone/>
-              <a:defRPr sz="2000">
-                <a:solidFill>
-                  <a:schemeClr val="tx1">
-                    <a:lumMod val="75000"/>
-                    <a:lumOff val="25000"/>
-                  </a:schemeClr>
-                </a:solidFill>
-              </a:defRPr>
+              <a:defRPr sz="2400"/>
             </a:lvl1pPr>
             <a:lvl2pPr marL="457200" indent="0" algn="ctr">
               <a:buNone/>
@@ -261,13 +245,18 @@
               <a:rPr lang="en-US"/>
               <a:t>Click to edit Master subtitle style</a:t>
             </a:r>
-            <a:endParaRPr lang="en-US" dirty="0"/>
-          </a:p>
-        </p:txBody>
-      </p:sp>
-      <p:sp>
-        <p:nvSpPr>
-          <p:cNvPr id="7" name="Date Placeholder 6"/>
+          </a:p>
+        </p:txBody>
+      </p:sp>
+      <p:sp>
+        <p:nvSpPr>
+          <p:cNvPr id="4" name="Date Placeholder 3">
+            <a:extLst>
+              <a:ext uri="{FF2B5EF4-FFF2-40B4-BE49-F238E27FC236}">
+                <a16:creationId xmlns:a16="http://schemas.microsoft.com/office/drawing/2014/main" id="{8F8E33CD-48DF-41F5-B73D-F4B7C7FF280A}"/>
+              </a:ext>
+            </a:extLst>
+          </p:cNvPr>
           <p:cNvSpPr>
             <a:spLocks noGrp="1"/>
           </p:cNvSpPr>
@@ -282,7 +271,7 @@
           <a:p>
             <a:fld id="{085C4363-0C8D-4048-885D-EDEB801BB229}" type="datetimeFigureOut">
               <a:rPr lang="en-US" smtClean="0"/>
-              <a:t>10/6/2021</a:t>
+              <a:t>11/19/2021</a:t>
             </a:fld>
             <a:endParaRPr lang="en-US"/>
           </a:p>
@@ -290,7 +279,13 @@
       </p:sp>
       <p:sp>
         <p:nvSpPr>
-          <p:cNvPr id="8" name="Footer Placeholder 7"/>
+          <p:cNvPr id="5" name="Footer Placeholder 4">
+            <a:extLst>
+              <a:ext uri="{FF2B5EF4-FFF2-40B4-BE49-F238E27FC236}">
+                <a16:creationId xmlns:a16="http://schemas.microsoft.com/office/drawing/2014/main" id="{1ED5C65E-A41D-4584-9470-E9A1A3CC9F82}"/>
+              </a:ext>
+            </a:extLst>
+          </p:cNvPr>
           <p:cNvSpPr>
             <a:spLocks noGrp="1"/>
           </p:cNvSpPr>
@@ -309,7 +304,13 @@
       </p:sp>
       <p:sp>
         <p:nvSpPr>
-          <p:cNvPr id="9" name="Slide Number Placeholder 8"/>
+          <p:cNvPr id="6" name="Slide Number Placeholder 5">
+            <a:extLst>
+              <a:ext uri="{FF2B5EF4-FFF2-40B4-BE49-F238E27FC236}">
+                <a16:creationId xmlns:a16="http://schemas.microsoft.com/office/drawing/2014/main" id="{F88677C4-A68A-419A-AA0C-023A74A8E1EE}"/>
+              </a:ext>
+            </a:extLst>
+          </p:cNvPr>
           <p:cNvSpPr>
             <a:spLocks noGrp="1"/>
           </p:cNvSpPr>
@@ -333,12 +334,12 @@
     </p:spTree>
     <p:extLst>
       <p:ext uri="{BB962C8B-B14F-4D97-AF65-F5344CB8AC3E}">
-        <p14:creationId xmlns:p14="http://schemas.microsoft.com/office/powerpoint/2010/main" val="2956657893"/>
+        <p14:creationId xmlns:p14="http://schemas.microsoft.com/office/powerpoint/2010/main" val="817871429"/>
       </p:ext>
     </p:extLst>
   </p:cSld>
   <p:clrMapOvr>
-    <a:overrideClrMapping bg1="dk1" tx1="lt1" bg2="dk2" tx2="lt2" accent1="accent1" accent2="accent2" accent3="accent3" accent4="accent4" accent5="accent5" accent6="accent6" hlink="hlink" folHlink="folHlink"/>
+    <a:masterClrMapping/>
   </p:clrMapOvr>
 </p:sldLayout>
 </file>
@@ -362,7 +363,13 @@
       </p:grpSpPr>
       <p:sp>
         <p:nvSpPr>
-          <p:cNvPr id="2" name="Title 1"/>
+          <p:cNvPr id="2" name="Title 1">
+            <a:extLst>
+              <a:ext uri="{FF2B5EF4-FFF2-40B4-BE49-F238E27FC236}">
+                <a16:creationId xmlns:a16="http://schemas.microsoft.com/office/drawing/2014/main" id="{965FAD26-0C95-4906-9E86-1FD3D8F6FD03}"/>
+              </a:ext>
+            </a:extLst>
+          </p:cNvPr>
           <p:cNvSpPr>
             <a:spLocks noGrp="1"/>
           </p:cNvSpPr>
@@ -379,13 +386,18 @@
               <a:rPr lang="en-US"/>
               <a:t>Click to edit Master title style</a:t>
             </a:r>
-            <a:endParaRPr lang="en-US" dirty="0"/>
-          </a:p>
-        </p:txBody>
-      </p:sp>
-      <p:sp>
-        <p:nvSpPr>
-          <p:cNvPr id="3" name="Vertical Text Placeholder 2"/>
+          </a:p>
+        </p:txBody>
+      </p:sp>
+      <p:sp>
+        <p:nvSpPr>
+          <p:cNvPr id="3" name="Vertical Text Placeholder 2">
+            <a:extLst>
+              <a:ext uri="{FF2B5EF4-FFF2-40B4-BE49-F238E27FC236}">
+                <a16:creationId xmlns:a16="http://schemas.microsoft.com/office/drawing/2014/main" id="{9B7C8428-2F7A-4C96-928C-9ED7E922E388}"/>
+              </a:ext>
+            </a:extLst>
+          </p:cNvPr>
           <p:cNvSpPr>
             <a:spLocks noGrp="1"/>
           </p:cNvSpPr>
@@ -431,13 +443,18 @@
               <a:rPr lang="en-US"/>
               <a:t>Fifth level</a:t>
             </a:r>
-            <a:endParaRPr lang="en-US" dirty="0"/>
-          </a:p>
-        </p:txBody>
-      </p:sp>
-      <p:sp>
-        <p:nvSpPr>
-          <p:cNvPr id="4" name="Date Placeholder 3"/>
+          </a:p>
+        </p:txBody>
+      </p:sp>
+      <p:sp>
+        <p:nvSpPr>
+          <p:cNvPr id="4" name="Date Placeholder 3">
+            <a:extLst>
+              <a:ext uri="{FF2B5EF4-FFF2-40B4-BE49-F238E27FC236}">
+                <a16:creationId xmlns:a16="http://schemas.microsoft.com/office/drawing/2014/main" id="{85519DA0-FFB0-4041-A3B1-D8B1AF2CABB5}"/>
+              </a:ext>
+            </a:extLst>
+          </p:cNvPr>
           <p:cNvSpPr>
             <a:spLocks noGrp="1"/>
           </p:cNvSpPr>
@@ -452,7 +469,7 @@
           <a:p>
             <a:fld id="{085C4363-0C8D-4048-885D-EDEB801BB229}" type="datetimeFigureOut">
               <a:rPr lang="en-US" smtClean="0"/>
-              <a:t>10/6/2021</a:t>
+              <a:t>11/19/2021</a:t>
             </a:fld>
             <a:endParaRPr lang="en-US"/>
           </a:p>
@@ -460,7 +477,13 @@
       </p:sp>
       <p:sp>
         <p:nvSpPr>
-          <p:cNvPr id="5" name="Footer Placeholder 4"/>
+          <p:cNvPr id="5" name="Footer Placeholder 4">
+            <a:extLst>
+              <a:ext uri="{FF2B5EF4-FFF2-40B4-BE49-F238E27FC236}">
+                <a16:creationId xmlns:a16="http://schemas.microsoft.com/office/drawing/2014/main" id="{9CB2884B-F088-46CC-B29C-AAE66892B805}"/>
+              </a:ext>
+            </a:extLst>
+          </p:cNvPr>
           <p:cNvSpPr>
             <a:spLocks noGrp="1"/>
           </p:cNvSpPr>
@@ -479,7 +502,13 @@
       </p:sp>
       <p:sp>
         <p:nvSpPr>
-          <p:cNvPr id="6" name="Slide Number Placeholder 5"/>
+          <p:cNvPr id="6" name="Slide Number Placeholder 5">
+            <a:extLst>
+              <a:ext uri="{FF2B5EF4-FFF2-40B4-BE49-F238E27FC236}">
+                <a16:creationId xmlns:a16="http://schemas.microsoft.com/office/drawing/2014/main" id="{CCB9D96E-B9C9-46D0-BDDD-068CB14CC03E}"/>
+              </a:ext>
+            </a:extLst>
+          </p:cNvPr>
           <p:cNvSpPr>
             <a:spLocks noGrp="1"/>
           </p:cNvSpPr>
@@ -503,7 +532,7 @@
     </p:spTree>
     <p:extLst>
       <p:ext uri="{BB962C8B-B14F-4D97-AF65-F5344CB8AC3E}">
-        <p14:creationId xmlns:p14="http://schemas.microsoft.com/office/powerpoint/2010/main" val="2443900960"/>
+        <p14:creationId xmlns:p14="http://schemas.microsoft.com/office/powerpoint/2010/main" val="3321620921"/>
       </p:ext>
     </p:extLst>
   </p:cSld>
@@ -532,7 +561,13 @@
       </p:grpSpPr>
       <p:sp>
         <p:nvSpPr>
-          <p:cNvPr id="2" name="Vertical Title 1"/>
+          <p:cNvPr id="2" name="Vertical Title 1">
+            <a:extLst>
+              <a:ext uri="{FF2B5EF4-FFF2-40B4-BE49-F238E27FC236}">
+                <a16:creationId xmlns:a16="http://schemas.microsoft.com/office/drawing/2014/main" id="{70B0EA5D-DCDB-4BE4-92ED-52EF734C761F}"/>
+              </a:ext>
+            </a:extLst>
+          </p:cNvPr>
           <p:cNvSpPr>
             <a:spLocks noGrp="1"/>
           </p:cNvSpPr>
@@ -542,8 +577,8 @@
         </p:nvSpPr>
         <p:spPr>
           <a:xfrm>
-            <a:off x="8653112" y="937260"/>
-            <a:ext cx="1298608" cy="4983480"/>
+            <a:off x="8724900" y="365125"/>
+            <a:ext cx="2628900" cy="5811838"/>
           </a:xfrm>
         </p:spPr>
         <p:txBody>
@@ -554,13 +589,18 @@
               <a:rPr lang="en-US"/>
               <a:t>Click to edit Master title style</a:t>
             </a:r>
-            <a:endParaRPr lang="en-US" dirty="0"/>
-          </a:p>
-        </p:txBody>
-      </p:sp>
-      <p:sp>
-        <p:nvSpPr>
-          <p:cNvPr id="3" name="Vertical Text Placeholder 2"/>
+          </a:p>
+        </p:txBody>
+      </p:sp>
+      <p:sp>
+        <p:nvSpPr>
+          <p:cNvPr id="3" name="Vertical Text Placeholder 2">
+            <a:extLst>
+              <a:ext uri="{FF2B5EF4-FFF2-40B4-BE49-F238E27FC236}">
+                <a16:creationId xmlns:a16="http://schemas.microsoft.com/office/drawing/2014/main" id="{99A55D89-2D39-4605-A828-B123AEED8FC1}"/>
+              </a:ext>
+            </a:extLst>
+          </p:cNvPr>
           <p:cNvSpPr>
             <a:spLocks noGrp="1"/>
           </p:cNvSpPr>
@@ -570,8 +610,8 @@
         </p:nvSpPr>
         <p:spPr>
           <a:xfrm>
-            <a:off x="2231136" y="937260"/>
-            <a:ext cx="6198489" cy="4983480"/>
+            <a:off x="838200" y="365125"/>
+            <a:ext cx="7734300" cy="5811838"/>
           </a:xfrm>
         </p:spPr>
         <p:txBody>
@@ -611,13 +651,18 @@
               <a:rPr lang="en-US"/>
               <a:t>Fifth level</a:t>
             </a:r>
-            <a:endParaRPr lang="en-US" dirty="0"/>
-          </a:p>
-        </p:txBody>
-      </p:sp>
-      <p:sp>
-        <p:nvSpPr>
-          <p:cNvPr id="4" name="Date Placeholder 3"/>
+          </a:p>
+        </p:txBody>
+      </p:sp>
+      <p:sp>
+        <p:nvSpPr>
+          <p:cNvPr id="4" name="Date Placeholder 3">
+            <a:extLst>
+              <a:ext uri="{FF2B5EF4-FFF2-40B4-BE49-F238E27FC236}">
+                <a16:creationId xmlns:a16="http://schemas.microsoft.com/office/drawing/2014/main" id="{3F949ED6-F381-4ABB-8681-D63C55EE9FD9}"/>
+              </a:ext>
+            </a:extLst>
+          </p:cNvPr>
           <p:cNvSpPr>
             <a:spLocks noGrp="1"/>
           </p:cNvSpPr>
@@ -632,7 +677,7 @@
           <a:p>
             <a:fld id="{085C4363-0C8D-4048-885D-EDEB801BB229}" type="datetimeFigureOut">
               <a:rPr lang="en-US" smtClean="0"/>
-              <a:t>10/6/2021</a:t>
+              <a:t>11/19/2021</a:t>
             </a:fld>
             <a:endParaRPr lang="en-US"/>
           </a:p>
@@ -640,7 +685,13 @@
       </p:sp>
       <p:sp>
         <p:nvSpPr>
-          <p:cNvPr id="5" name="Footer Placeholder 4"/>
+          <p:cNvPr id="5" name="Footer Placeholder 4">
+            <a:extLst>
+              <a:ext uri="{FF2B5EF4-FFF2-40B4-BE49-F238E27FC236}">
+                <a16:creationId xmlns:a16="http://schemas.microsoft.com/office/drawing/2014/main" id="{F4A19A71-649E-4BDF-938D-FD8D642391B4}"/>
+              </a:ext>
+            </a:extLst>
+          </p:cNvPr>
           <p:cNvSpPr>
             <a:spLocks noGrp="1"/>
           </p:cNvSpPr>
@@ -659,7 +710,13 @@
       </p:sp>
       <p:sp>
         <p:nvSpPr>
-          <p:cNvPr id="6" name="Slide Number Placeholder 5"/>
+          <p:cNvPr id="6" name="Slide Number Placeholder 5">
+            <a:extLst>
+              <a:ext uri="{FF2B5EF4-FFF2-40B4-BE49-F238E27FC236}">
+                <a16:creationId xmlns:a16="http://schemas.microsoft.com/office/drawing/2014/main" id="{16335952-1C77-4375-A9F9-EAB9EA6DBCB6}"/>
+              </a:ext>
+            </a:extLst>
+          </p:cNvPr>
           <p:cNvSpPr>
             <a:spLocks noGrp="1"/>
           </p:cNvSpPr>
@@ -683,7 +740,7 @@
     </p:spTree>
     <p:extLst>
       <p:ext uri="{BB962C8B-B14F-4D97-AF65-F5344CB8AC3E}">
-        <p14:creationId xmlns:p14="http://schemas.microsoft.com/office/powerpoint/2010/main" val="2703077516"/>
+        <p14:creationId xmlns:p14="http://schemas.microsoft.com/office/powerpoint/2010/main" val="2269331130"/>
       </p:ext>
     </p:extLst>
   </p:cSld>
@@ -712,7 +769,13 @@
       </p:grpSpPr>
       <p:sp>
         <p:nvSpPr>
-          <p:cNvPr id="2" name="Title 1"/>
+          <p:cNvPr id="2" name="Title 1">
+            <a:extLst>
+              <a:ext uri="{FF2B5EF4-FFF2-40B4-BE49-F238E27FC236}">
+                <a16:creationId xmlns:a16="http://schemas.microsoft.com/office/drawing/2014/main" id="{6E0F655B-283E-41FE-8696-FB8CB73445A3}"/>
+              </a:ext>
+            </a:extLst>
+          </p:cNvPr>
           <p:cNvSpPr>
             <a:spLocks noGrp="1"/>
           </p:cNvSpPr>
@@ -729,13 +792,18 @@
               <a:rPr lang="en-US"/>
               <a:t>Click to edit Master title style</a:t>
             </a:r>
-            <a:endParaRPr lang="en-US" dirty="0"/>
-          </a:p>
-        </p:txBody>
-      </p:sp>
-      <p:sp>
-        <p:nvSpPr>
-          <p:cNvPr id="3" name="Content Placeholder 2"/>
+          </a:p>
+        </p:txBody>
+      </p:sp>
+      <p:sp>
+        <p:nvSpPr>
+          <p:cNvPr id="3" name="Content Placeholder 2">
+            <a:extLst>
+              <a:ext uri="{FF2B5EF4-FFF2-40B4-BE49-F238E27FC236}">
+                <a16:creationId xmlns:a16="http://schemas.microsoft.com/office/drawing/2014/main" id="{012CD5FB-23B2-4FDB-B38C-FD3B082676CF}"/>
+              </a:ext>
+            </a:extLst>
+          </p:cNvPr>
           <p:cNvSpPr>
             <a:spLocks noGrp="1"/>
           </p:cNvSpPr>
@@ -781,13 +849,18 @@
               <a:rPr lang="en-US"/>
               <a:t>Fifth level</a:t>
             </a:r>
-            <a:endParaRPr lang="en-US" dirty="0"/>
-          </a:p>
-        </p:txBody>
-      </p:sp>
-      <p:sp>
-        <p:nvSpPr>
-          <p:cNvPr id="7" name="Date Placeholder 6"/>
+          </a:p>
+        </p:txBody>
+      </p:sp>
+      <p:sp>
+        <p:nvSpPr>
+          <p:cNvPr id="4" name="Date Placeholder 3">
+            <a:extLst>
+              <a:ext uri="{FF2B5EF4-FFF2-40B4-BE49-F238E27FC236}">
+                <a16:creationId xmlns:a16="http://schemas.microsoft.com/office/drawing/2014/main" id="{DAABE522-CB91-458B-9D3B-328EAB03B569}"/>
+              </a:ext>
+            </a:extLst>
+          </p:cNvPr>
           <p:cNvSpPr>
             <a:spLocks noGrp="1"/>
           </p:cNvSpPr>
@@ -802,7 +875,7 @@
           <a:p>
             <a:fld id="{085C4363-0C8D-4048-885D-EDEB801BB229}" type="datetimeFigureOut">
               <a:rPr lang="en-US" smtClean="0"/>
-              <a:t>10/6/2021</a:t>
+              <a:t>11/19/2021</a:t>
             </a:fld>
             <a:endParaRPr lang="en-US"/>
           </a:p>
@@ -810,7 +883,13 @@
       </p:sp>
       <p:sp>
         <p:nvSpPr>
-          <p:cNvPr id="8" name="Footer Placeholder 7"/>
+          <p:cNvPr id="5" name="Footer Placeholder 4">
+            <a:extLst>
+              <a:ext uri="{FF2B5EF4-FFF2-40B4-BE49-F238E27FC236}">
+                <a16:creationId xmlns:a16="http://schemas.microsoft.com/office/drawing/2014/main" id="{85FF9337-442F-42AB-A422-DD29B829A98C}"/>
+              </a:ext>
+            </a:extLst>
+          </p:cNvPr>
           <p:cNvSpPr>
             <a:spLocks noGrp="1"/>
           </p:cNvSpPr>
@@ -829,7 +908,13 @@
       </p:sp>
       <p:sp>
         <p:nvSpPr>
-          <p:cNvPr id="9" name="Slide Number Placeholder 8"/>
+          <p:cNvPr id="6" name="Slide Number Placeholder 5">
+            <a:extLst>
+              <a:ext uri="{FF2B5EF4-FFF2-40B4-BE49-F238E27FC236}">
+                <a16:creationId xmlns:a16="http://schemas.microsoft.com/office/drawing/2014/main" id="{DCA360F6-5BA1-4534-B183-97A01F4D5A47}"/>
+              </a:ext>
+            </a:extLst>
+          </p:cNvPr>
           <p:cNvSpPr>
             <a:spLocks noGrp="1"/>
           </p:cNvSpPr>
@@ -853,7 +938,7 @@
     </p:spTree>
     <p:extLst>
       <p:ext uri="{BB962C8B-B14F-4D97-AF65-F5344CB8AC3E}">
-        <p14:creationId xmlns:p14="http://schemas.microsoft.com/office/powerpoint/2010/main" val="2403819178"/>
+        <p14:creationId xmlns:p14="http://schemas.microsoft.com/office/powerpoint/2010/main" val="3798301016"/>
       </p:ext>
     </p:extLst>
   </p:cSld>
@@ -866,14 +951,6 @@
 <file path=ppt/slideLayouts/slideLayout3.xml><?xml version="1.0" encoding="utf-8"?>
 <p:sldLayout xmlns:a="http://schemas.openxmlformats.org/drawingml/2006/main" xmlns:r="http://schemas.openxmlformats.org/officeDocument/2006/relationships" xmlns:p="http://schemas.openxmlformats.org/presentationml/2006/main" type="secHead" preserve="1">
   <p:cSld name="Section Header">
-    <p:bg>
-      <p:bgPr>
-        <a:solidFill>
-          <a:schemeClr val="accent1"/>
-        </a:solidFill>
-        <a:effectLst/>
-      </p:bgPr>
-    </p:bg>
     <p:spTree>
       <p:nvGrpSpPr>
         <p:cNvPr id="1" name=""/>
@@ -890,7 +967,13 @@
       </p:grpSpPr>
       <p:sp>
         <p:nvSpPr>
-          <p:cNvPr id="2" name="Title 1"/>
+          <p:cNvPr id="2" name="Title 1">
+            <a:extLst>
+              <a:ext uri="{FF2B5EF4-FFF2-40B4-BE49-F238E27FC236}">
+                <a16:creationId xmlns:a16="http://schemas.microsoft.com/office/drawing/2014/main" id="{48206E14-D389-4ACD-8837-6F2013DF1B74}"/>
+              </a:ext>
+            </a:extLst>
+          </p:cNvPr>
           <p:cNvSpPr>
             <a:spLocks noGrp="1"/>
           </p:cNvSpPr>
@@ -898,31 +981,17 @@
             <p:ph type="title"/>
           </p:nvPr>
         </p:nvSpPr>
-        <p:spPr bwMode="blackWhite">
+        <p:spPr>
           <a:xfrm>
-            <a:off x="1600200" y="2386744"/>
-            <a:ext cx="8991600" cy="1645920"/>
+            <a:off x="831850" y="1709738"/>
+            <a:ext cx="10515600" cy="2852737"/>
           </a:xfrm>
-          <a:solidFill>
-            <a:srgbClr val="FFFFFF"/>
-          </a:solidFill>
-          <a:ln w="38100">
-            <a:solidFill>
-              <a:srgbClr val="404040"/>
-            </a:solidFill>
-          </a:ln>
         </p:spPr>
         <p:txBody>
-          <a:bodyPr lIns="274320" rIns="274320" anchor="ctr" anchorCtr="1">
-            <a:normAutofit/>
-          </a:bodyPr>
+          <a:bodyPr anchor="b"/>
           <a:lstStyle>
             <a:lvl1pPr>
-              <a:defRPr sz="3800">
-                <a:solidFill>
-                  <a:srgbClr val="262626"/>
-                </a:solidFill>
-              </a:defRPr>
+              <a:defRPr sz="6000"/>
             </a:lvl1pPr>
           </a:lstStyle>
           <a:p>
@@ -930,13 +999,18 @@
               <a:rPr lang="en-US"/>
               <a:t>Click to edit Master title style</a:t>
             </a:r>
-            <a:endParaRPr lang="en-US" dirty="0"/>
-          </a:p>
-        </p:txBody>
-      </p:sp>
-      <p:sp>
-        <p:nvSpPr>
-          <p:cNvPr id="3" name="Text Placeholder 2"/>
+          </a:p>
+        </p:txBody>
+      </p:sp>
+      <p:sp>
+        <p:nvSpPr>
+          <p:cNvPr id="3" name="Text Placeholder 2">
+            <a:extLst>
+              <a:ext uri="{FF2B5EF4-FFF2-40B4-BE49-F238E27FC236}">
+                <a16:creationId xmlns:a16="http://schemas.microsoft.com/office/drawing/2014/main" id="{AE53E0DC-F682-45FC-B633-71118044BAA1}"/>
+              </a:ext>
+            </a:extLst>
+          </p:cNvPr>
           <p:cNvSpPr>
             <a:spLocks noGrp="1"/>
           </p:cNvSpPr>
@@ -946,20 +1020,20 @@
         </p:nvSpPr>
         <p:spPr>
           <a:xfrm>
-            <a:off x="2695194" y="4352465"/>
-            <a:ext cx="6801612" cy="1265082"/>
+            <a:off x="831850" y="4589463"/>
+            <a:ext cx="10515600" cy="1500187"/>
           </a:xfrm>
         </p:spPr>
         <p:txBody>
-          <a:bodyPr anchor="t" anchorCtr="1">
-            <a:normAutofit/>
-          </a:bodyPr>
+          <a:bodyPr/>
           <a:lstStyle>
             <a:lvl1pPr marL="0" indent="0">
               <a:buNone/>
-              <a:defRPr sz="2000">
+              <a:defRPr sz="2400">
                 <a:solidFill>
-                  <a:schemeClr val="tx1"/>
+                  <a:schemeClr val="tx1">
+                    <a:tint val="75000"/>
+                  </a:schemeClr>
                 </a:solidFill>
               </a:defRPr>
             </a:lvl1pPr>
@@ -1055,7 +1129,13 @@
       </p:sp>
       <p:sp>
         <p:nvSpPr>
-          <p:cNvPr id="7" name="Date Placeholder 6"/>
+          <p:cNvPr id="4" name="Date Placeholder 3">
+            <a:extLst>
+              <a:ext uri="{FF2B5EF4-FFF2-40B4-BE49-F238E27FC236}">
+                <a16:creationId xmlns:a16="http://schemas.microsoft.com/office/drawing/2014/main" id="{0FE6211E-D0E7-4491-9DAF-D7E713F02B6E}"/>
+              </a:ext>
+            </a:extLst>
+          </p:cNvPr>
           <p:cNvSpPr>
             <a:spLocks noGrp="1"/>
           </p:cNvSpPr>
@@ -1070,7 +1150,7 @@
           <a:p>
             <a:fld id="{085C4363-0C8D-4048-885D-EDEB801BB229}" type="datetimeFigureOut">
               <a:rPr lang="en-US" smtClean="0"/>
-              <a:t>10/6/2021</a:t>
+              <a:t>11/19/2021</a:t>
             </a:fld>
             <a:endParaRPr lang="en-US"/>
           </a:p>
@@ -1078,7 +1158,13 @@
       </p:sp>
       <p:sp>
         <p:nvSpPr>
-          <p:cNvPr id="8" name="Footer Placeholder 7"/>
+          <p:cNvPr id="5" name="Footer Placeholder 4">
+            <a:extLst>
+              <a:ext uri="{FF2B5EF4-FFF2-40B4-BE49-F238E27FC236}">
+                <a16:creationId xmlns:a16="http://schemas.microsoft.com/office/drawing/2014/main" id="{544DF429-C06E-44FC-A749-3C0C03F7543D}"/>
+              </a:ext>
+            </a:extLst>
+          </p:cNvPr>
           <p:cNvSpPr>
             <a:spLocks noGrp="1"/>
           </p:cNvSpPr>
@@ -1097,7 +1183,13 @@
       </p:sp>
       <p:sp>
         <p:nvSpPr>
-          <p:cNvPr id="9" name="Slide Number Placeholder 8"/>
+          <p:cNvPr id="6" name="Slide Number Placeholder 5">
+            <a:extLst>
+              <a:ext uri="{FF2B5EF4-FFF2-40B4-BE49-F238E27FC236}">
+                <a16:creationId xmlns:a16="http://schemas.microsoft.com/office/drawing/2014/main" id="{EC119F05-77F3-4378-9A8C-C547875ED9F4}"/>
+              </a:ext>
+            </a:extLst>
+          </p:cNvPr>
           <p:cNvSpPr>
             <a:spLocks noGrp="1"/>
           </p:cNvSpPr>
@@ -1121,12 +1213,12 @@
     </p:spTree>
     <p:extLst>
       <p:ext uri="{BB962C8B-B14F-4D97-AF65-F5344CB8AC3E}">
-        <p14:creationId xmlns:p14="http://schemas.microsoft.com/office/powerpoint/2010/main" val="2271709818"/>
+        <p14:creationId xmlns:p14="http://schemas.microsoft.com/office/powerpoint/2010/main" val="1265570899"/>
       </p:ext>
     </p:extLst>
   </p:cSld>
   <p:clrMapOvr>
-    <a:overrideClrMapping bg1="dk1" tx1="lt1" bg2="dk2" tx2="lt2" accent1="accent1" accent2="accent2" accent3="accent3" accent4="accent4" accent5="accent5" accent6="accent6" hlink="hlink" folHlink="folHlink"/>
+    <a:masterClrMapping/>
   </p:clrMapOvr>
 </p:sldLayout>
 </file>
@@ -1150,7 +1242,13 @@
       </p:grpSpPr>
       <p:sp>
         <p:nvSpPr>
-          <p:cNvPr id="2" name="Title 1"/>
+          <p:cNvPr id="2" name="Title 1">
+            <a:extLst>
+              <a:ext uri="{FF2B5EF4-FFF2-40B4-BE49-F238E27FC236}">
+                <a16:creationId xmlns:a16="http://schemas.microsoft.com/office/drawing/2014/main" id="{73F86045-7222-4109-B3DC-F3F7560F553C}"/>
+              </a:ext>
+            </a:extLst>
+          </p:cNvPr>
           <p:cNvSpPr>
             <a:spLocks noGrp="1"/>
           </p:cNvSpPr>
@@ -1167,13 +1265,18 @@
               <a:rPr lang="en-US"/>
               <a:t>Click to edit Master title style</a:t>
             </a:r>
-            <a:endParaRPr lang="en-US" dirty="0"/>
-          </a:p>
-        </p:txBody>
-      </p:sp>
-      <p:sp>
-        <p:nvSpPr>
-          <p:cNvPr id="3" name="Content Placeholder 2"/>
+          </a:p>
+        </p:txBody>
+      </p:sp>
+      <p:sp>
+        <p:nvSpPr>
+          <p:cNvPr id="3" name="Content Placeholder 2">
+            <a:extLst>
+              <a:ext uri="{FF2B5EF4-FFF2-40B4-BE49-F238E27FC236}">
+                <a16:creationId xmlns:a16="http://schemas.microsoft.com/office/drawing/2014/main" id="{E3F2D65F-68E4-448C-8792-AB09364CC58D}"/>
+              </a:ext>
+            </a:extLst>
+          </p:cNvPr>
           <p:cNvSpPr>
             <a:spLocks noGrp="1"/>
           </p:cNvSpPr>
@@ -1183,8 +1286,8 @@
         </p:nvSpPr>
         <p:spPr>
           <a:xfrm>
-            <a:off x="1581912" y="2638044"/>
-            <a:ext cx="4271771" cy="3101982"/>
+            <a:off x="838200" y="1825625"/>
+            <a:ext cx="5181600" cy="4351338"/>
           </a:xfrm>
         </p:spPr>
         <p:txBody>
@@ -1224,13 +1327,18 @@
               <a:rPr lang="en-US"/>
               <a:t>Fifth level</a:t>
             </a:r>
-            <a:endParaRPr lang="en-US" dirty="0"/>
-          </a:p>
-        </p:txBody>
-      </p:sp>
-      <p:sp>
-        <p:nvSpPr>
-          <p:cNvPr id="4" name="Content Placeholder 3"/>
+          </a:p>
+        </p:txBody>
+      </p:sp>
+      <p:sp>
+        <p:nvSpPr>
+          <p:cNvPr id="4" name="Content Placeholder 3">
+            <a:extLst>
+              <a:ext uri="{FF2B5EF4-FFF2-40B4-BE49-F238E27FC236}">
+                <a16:creationId xmlns:a16="http://schemas.microsoft.com/office/drawing/2014/main" id="{F888B558-3BE0-4226-A305-EF1DE0F3BB4F}"/>
+              </a:ext>
+            </a:extLst>
+          </p:cNvPr>
           <p:cNvSpPr>
             <a:spLocks noGrp="1"/>
           </p:cNvSpPr>
@@ -1240,8 +1348,8 @@
         </p:nvSpPr>
         <p:spPr>
           <a:xfrm>
-            <a:off x="6338315" y="2638044"/>
-            <a:ext cx="4270247" cy="3101982"/>
+            <a:off x="6172200" y="1825625"/>
+            <a:ext cx="5181600" cy="4351338"/>
           </a:xfrm>
         </p:spPr>
         <p:txBody>
@@ -1281,13 +1389,18 @@
               <a:rPr lang="en-US"/>
               <a:t>Fifth level</a:t>
             </a:r>
-            <a:endParaRPr lang="en-US" dirty="0"/>
-          </a:p>
-        </p:txBody>
-      </p:sp>
-      <p:sp>
-        <p:nvSpPr>
-          <p:cNvPr id="8" name="Date Placeholder 7"/>
+          </a:p>
+        </p:txBody>
+      </p:sp>
+      <p:sp>
+        <p:nvSpPr>
+          <p:cNvPr id="5" name="Date Placeholder 4">
+            <a:extLst>
+              <a:ext uri="{FF2B5EF4-FFF2-40B4-BE49-F238E27FC236}">
+                <a16:creationId xmlns:a16="http://schemas.microsoft.com/office/drawing/2014/main" id="{91374FAA-D11A-4DBA-A312-413839981BAD}"/>
+              </a:ext>
+            </a:extLst>
+          </p:cNvPr>
           <p:cNvSpPr>
             <a:spLocks noGrp="1"/>
           </p:cNvSpPr>
@@ -1302,7 +1415,7 @@
           <a:p>
             <a:fld id="{085C4363-0C8D-4048-885D-EDEB801BB229}" type="datetimeFigureOut">
               <a:rPr lang="en-US" smtClean="0"/>
-              <a:t>10/6/2021</a:t>
+              <a:t>11/19/2021</a:t>
             </a:fld>
             <a:endParaRPr lang="en-US"/>
           </a:p>
@@ -1310,7 +1423,13 @@
       </p:sp>
       <p:sp>
         <p:nvSpPr>
-          <p:cNvPr id="9" name="Footer Placeholder 8"/>
+          <p:cNvPr id="6" name="Footer Placeholder 5">
+            <a:extLst>
+              <a:ext uri="{FF2B5EF4-FFF2-40B4-BE49-F238E27FC236}">
+                <a16:creationId xmlns:a16="http://schemas.microsoft.com/office/drawing/2014/main" id="{0E611508-2913-4C23-9E7A-8E08F2217932}"/>
+              </a:ext>
+            </a:extLst>
+          </p:cNvPr>
           <p:cNvSpPr>
             <a:spLocks noGrp="1"/>
           </p:cNvSpPr>
@@ -1329,7 +1448,13 @@
       </p:sp>
       <p:sp>
         <p:nvSpPr>
-          <p:cNvPr id="10" name="Slide Number Placeholder 9"/>
+          <p:cNvPr id="7" name="Slide Number Placeholder 6">
+            <a:extLst>
+              <a:ext uri="{FF2B5EF4-FFF2-40B4-BE49-F238E27FC236}">
+                <a16:creationId xmlns:a16="http://schemas.microsoft.com/office/drawing/2014/main" id="{0696B062-15FA-44DD-A962-0A358D6C7EA5}"/>
+              </a:ext>
+            </a:extLst>
+          </p:cNvPr>
           <p:cNvSpPr>
             <a:spLocks noGrp="1"/>
           </p:cNvSpPr>
@@ -1353,7 +1478,7 @@
     </p:spTree>
     <p:extLst>
       <p:ext uri="{BB962C8B-B14F-4D97-AF65-F5344CB8AC3E}">
-        <p14:creationId xmlns:p14="http://schemas.microsoft.com/office/powerpoint/2010/main" val="3214158608"/>
+        <p14:creationId xmlns:p14="http://schemas.microsoft.com/office/powerpoint/2010/main" val="1909630809"/>
       </p:ext>
     </p:extLst>
   </p:cSld>
@@ -1382,38 +1507,69 @@
       </p:grpSpPr>
       <p:sp>
         <p:nvSpPr>
-          <p:cNvPr id="3" name="Text Placeholder 2"/>
-          <p:cNvSpPr>
-            <a:spLocks noGrp="1"/>
-          </p:cNvSpPr>
-          <p:nvPr>
-            <p:ph type="body" idx="1"/>
+          <p:cNvPr id="2" name="Title 1">
+            <a:extLst>
+              <a:ext uri="{FF2B5EF4-FFF2-40B4-BE49-F238E27FC236}">
+                <a16:creationId xmlns:a16="http://schemas.microsoft.com/office/drawing/2014/main" id="{E0C5E765-4893-4DA9-88E9-20545BB09879}"/>
+              </a:ext>
+            </a:extLst>
+          </p:cNvPr>
+          <p:cNvSpPr>
+            <a:spLocks noGrp="1"/>
+          </p:cNvSpPr>
+          <p:nvPr>
+            <p:ph type="title"/>
           </p:nvPr>
         </p:nvSpPr>
         <p:spPr>
           <a:xfrm>
-            <a:off x="1583436" y="2313433"/>
-            <a:ext cx="4270248" cy="704087"/>
+            <a:off x="839788" y="365125"/>
+            <a:ext cx="10515600" cy="1325563"/>
           </a:xfrm>
         </p:spPr>
         <p:txBody>
-          <a:bodyPr anchor="b" anchorCtr="1">
-            <a:normAutofit/>
-          </a:bodyPr>
+          <a:bodyPr/>
+          <a:lstStyle/>
+          <a:p>
+            <a:r>
+              <a:rPr lang="en-US"/>
+              <a:t>Click to edit Master title style</a:t>
+            </a:r>
+          </a:p>
+        </p:txBody>
+      </p:sp>
+      <p:sp>
+        <p:nvSpPr>
+          <p:cNvPr id="3" name="Text Placeholder 2">
+            <a:extLst>
+              <a:ext uri="{FF2B5EF4-FFF2-40B4-BE49-F238E27FC236}">
+                <a16:creationId xmlns:a16="http://schemas.microsoft.com/office/drawing/2014/main" id="{4713F571-F910-4177-A24F-65BA6579BC89}"/>
+              </a:ext>
+            </a:extLst>
+          </p:cNvPr>
+          <p:cNvSpPr>
+            <a:spLocks noGrp="1"/>
+          </p:cNvSpPr>
+          <p:nvPr>
+            <p:ph type="body" idx="1"/>
+          </p:nvPr>
+        </p:nvSpPr>
+        <p:spPr>
+          <a:xfrm>
+            <a:off x="839788" y="1681163"/>
+            <a:ext cx="5157787" cy="823912"/>
+          </a:xfrm>
+        </p:spPr>
+        <p:txBody>
+          <a:bodyPr anchor="b"/>
           <a:lstStyle>
-            <a:lvl1pPr marL="0" indent="0" algn="ctr">
-              <a:buNone/>
-              <a:defRPr sz="1900" b="0" cap="all" spc="100" baseline="0">
-                <a:solidFill>
-                  <a:schemeClr val="accent2">
-                    <a:lumMod val="75000"/>
-                  </a:schemeClr>
-                </a:solidFill>
-              </a:defRPr>
+            <a:lvl1pPr marL="0" indent="0">
+              <a:buNone/>
+              <a:defRPr sz="2400" b="1"/>
             </a:lvl1pPr>
             <a:lvl2pPr marL="457200" indent="0">
               <a:buNone/>
-              <a:defRPr sz="1900" b="1"/>
+              <a:defRPr sz="2000" b="1"/>
             </a:lvl2pPr>
             <a:lvl3pPr marL="914400" indent="0">
               <a:buNone/>
@@ -1455,7 +1611,13 @@
       </p:sp>
       <p:sp>
         <p:nvSpPr>
-          <p:cNvPr id="4" name="Content Placeholder 3"/>
+          <p:cNvPr id="4" name="Content Placeholder 3">
+            <a:extLst>
+              <a:ext uri="{FF2B5EF4-FFF2-40B4-BE49-F238E27FC236}">
+                <a16:creationId xmlns:a16="http://schemas.microsoft.com/office/drawing/2014/main" id="{0CDA46C1-C7E5-491B-A7E3-F37C3C5198A6}"/>
+              </a:ext>
+            </a:extLst>
+          </p:cNvPr>
           <p:cNvSpPr>
             <a:spLocks noGrp="1"/>
           </p:cNvSpPr>
@@ -1465,8 +1627,8 @@
         </p:nvSpPr>
         <p:spPr>
           <a:xfrm>
-            <a:off x="1583436" y="3143250"/>
-            <a:ext cx="4270248" cy="2596776"/>
+            <a:off x="839788" y="2505075"/>
+            <a:ext cx="5157787" cy="3684588"/>
           </a:xfrm>
         </p:spPr>
         <p:txBody>
@@ -1506,105 +1668,41 @@
               <a:rPr lang="en-US"/>
               <a:t>Fifth level</a:t>
             </a:r>
-            <a:endParaRPr lang="en-US" dirty="0"/>
-          </a:p>
-        </p:txBody>
-      </p:sp>
-      <p:sp>
-        <p:nvSpPr>
-          <p:cNvPr id="6" name="Content Placeholder 5"/>
-          <p:cNvSpPr>
-            <a:spLocks noGrp="1"/>
-          </p:cNvSpPr>
-          <p:nvPr>
-            <p:ph sz="quarter" idx="4"/>
+          </a:p>
+        </p:txBody>
+      </p:sp>
+      <p:sp>
+        <p:nvSpPr>
+          <p:cNvPr id="5" name="Text Placeholder 4">
+            <a:extLst>
+              <a:ext uri="{FF2B5EF4-FFF2-40B4-BE49-F238E27FC236}">
+                <a16:creationId xmlns:a16="http://schemas.microsoft.com/office/drawing/2014/main" id="{665B3768-DCD8-4AD4-BE26-54E082CD4436}"/>
+              </a:ext>
+            </a:extLst>
+          </p:cNvPr>
+          <p:cNvSpPr>
+            <a:spLocks noGrp="1"/>
+          </p:cNvSpPr>
+          <p:nvPr>
+            <p:ph type="body" sz="quarter" idx="3"/>
           </p:nvPr>
         </p:nvSpPr>
         <p:spPr>
           <a:xfrm>
-            <a:off x="6338316" y="3143250"/>
-            <a:ext cx="4253484" cy="2596776"/>
+            <a:off x="6172200" y="1681163"/>
+            <a:ext cx="5183188" cy="823912"/>
           </a:xfrm>
         </p:spPr>
         <p:txBody>
-          <a:bodyPr/>
+          <a:bodyPr anchor="b"/>
           <a:lstStyle>
-            <a:lvl5pPr>
-              <a:defRPr/>
-            </a:lvl5pPr>
-          </a:lstStyle>
-          <a:p>
-            <a:pPr lvl="0"/>
-            <a:r>
-              <a:rPr lang="en-US"/>
-              <a:t>Click to edit Master text styles</a:t>
-            </a:r>
-          </a:p>
-          <a:p>
-            <a:pPr lvl="1"/>
-            <a:r>
-              <a:rPr lang="en-US"/>
-              <a:t>Second level</a:t>
-            </a:r>
-          </a:p>
-          <a:p>
-            <a:pPr lvl="2"/>
-            <a:r>
-              <a:rPr lang="en-US"/>
-              <a:t>Third level</a:t>
-            </a:r>
-          </a:p>
-          <a:p>
-            <a:pPr lvl="3"/>
-            <a:r>
-              <a:rPr lang="en-US"/>
-              <a:t>Fourth level</a:t>
-            </a:r>
-          </a:p>
-          <a:p>
-            <a:pPr lvl="4"/>
-            <a:r>
-              <a:rPr lang="en-US"/>
-              <a:t>Fifth level</a:t>
-            </a:r>
-            <a:endParaRPr lang="en-US" dirty="0"/>
-          </a:p>
-        </p:txBody>
-      </p:sp>
-      <p:sp>
-        <p:nvSpPr>
-          <p:cNvPr id="11" name="Text Placeholder 4"/>
-          <p:cNvSpPr>
-            <a:spLocks noGrp="1"/>
-          </p:cNvSpPr>
-          <p:nvPr>
-            <p:ph type="body" sz="quarter" idx="13"/>
-          </p:nvPr>
-        </p:nvSpPr>
-        <p:spPr>
-          <a:xfrm>
-            <a:off x="6338316" y="2313433"/>
-            <a:ext cx="4270248" cy="704087"/>
-          </a:xfrm>
-        </p:spPr>
-        <p:txBody>
-          <a:bodyPr anchor="b" anchorCtr="1">
-            <a:normAutofit/>
-          </a:bodyPr>
-          <a:lstStyle>
-            <a:lvl1pPr marL="0" indent="0" algn="ctr">
-              <a:buNone/>
-              <a:defRPr sz="1900" b="0" cap="all" spc="100" baseline="0">
-                <a:solidFill>
-                  <a:schemeClr val="accent2">
-                    <a:lumMod val="75000"/>
-                  </a:schemeClr>
-                </a:solidFill>
-              </a:defRPr>
+            <a:lvl1pPr marL="0" indent="0">
+              <a:buNone/>
+              <a:defRPr sz="2400" b="1"/>
             </a:lvl1pPr>
             <a:lvl2pPr marL="457200" indent="0">
               <a:buNone/>
-              <a:defRPr sz="1900" b="1"/>
+              <a:defRPr sz="2000" b="1"/>
             </a:lvl2pPr>
             <a:lvl3pPr marL="914400" indent="0">
               <a:buNone/>
@@ -1646,7 +1744,75 @@
       </p:sp>
       <p:sp>
         <p:nvSpPr>
-          <p:cNvPr id="7" name="Date Placeholder 6"/>
+          <p:cNvPr id="6" name="Content Placeholder 5">
+            <a:extLst>
+              <a:ext uri="{FF2B5EF4-FFF2-40B4-BE49-F238E27FC236}">
+                <a16:creationId xmlns:a16="http://schemas.microsoft.com/office/drawing/2014/main" id="{0F4A0DCE-37C8-44C7-999C-90B23FB4AAF7}"/>
+              </a:ext>
+            </a:extLst>
+          </p:cNvPr>
+          <p:cNvSpPr>
+            <a:spLocks noGrp="1"/>
+          </p:cNvSpPr>
+          <p:nvPr>
+            <p:ph sz="quarter" idx="4"/>
+          </p:nvPr>
+        </p:nvSpPr>
+        <p:spPr>
+          <a:xfrm>
+            <a:off x="6172200" y="2505075"/>
+            <a:ext cx="5183188" cy="3684588"/>
+          </a:xfrm>
+        </p:spPr>
+        <p:txBody>
+          <a:bodyPr/>
+          <a:lstStyle/>
+          <a:p>
+            <a:pPr lvl="0"/>
+            <a:r>
+              <a:rPr lang="en-US"/>
+              <a:t>Click to edit Master text styles</a:t>
+            </a:r>
+          </a:p>
+          <a:p>
+            <a:pPr lvl="1"/>
+            <a:r>
+              <a:rPr lang="en-US"/>
+              <a:t>Second level</a:t>
+            </a:r>
+          </a:p>
+          <a:p>
+            <a:pPr lvl="2"/>
+            <a:r>
+              <a:rPr lang="en-US"/>
+              <a:t>Third level</a:t>
+            </a:r>
+          </a:p>
+          <a:p>
+            <a:pPr lvl="3"/>
+            <a:r>
+              <a:rPr lang="en-US"/>
+              <a:t>Fourth level</a:t>
+            </a:r>
+          </a:p>
+          <a:p>
+            <a:pPr lvl="4"/>
+            <a:r>
+              <a:rPr lang="en-US"/>
+              <a:t>Fifth level</a:t>
+            </a:r>
+          </a:p>
+        </p:txBody>
+      </p:sp>
+      <p:sp>
+        <p:nvSpPr>
+          <p:cNvPr id="7" name="Date Placeholder 6">
+            <a:extLst>
+              <a:ext uri="{FF2B5EF4-FFF2-40B4-BE49-F238E27FC236}">
+                <a16:creationId xmlns:a16="http://schemas.microsoft.com/office/drawing/2014/main" id="{5F213C5A-130C-403C-9A92-AFAC46F03428}"/>
+              </a:ext>
+            </a:extLst>
+          </p:cNvPr>
           <p:cNvSpPr>
             <a:spLocks noGrp="1"/>
           </p:cNvSpPr>
@@ -1661,7 +1827,7 @@
           <a:p>
             <a:fld id="{085C4363-0C8D-4048-885D-EDEB801BB229}" type="datetimeFigureOut">
               <a:rPr lang="en-US" smtClean="0"/>
-              <a:t>10/6/2021</a:t>
+              <a:t>11/19/2021</a:t>
             </a:fld>
             <a:endParaRPr lang="en-US"/>
           </a:p>
@@ -1669,7 +1835,13 @@
       </p:sp>
       <p:sp>
         <p:nvSpPr>
-          <p:cNvPr id="8" name="Footer Placeholder 7"/>
+          <p:cNvPr id="8" name="Footer Placeholder 7">
+            <a:extLst>
+              <a:ext uri="{FF2B5EF4-FFF2-40B4-BE49-F238E27FC236}">
+                <a16:creationId xmlns:a16="http://schemas.microsoft.com/office/drawing/2014/main" id="{A33D772E-F5E0-4ABA-B5FD-ED75CEEADB0C}"/>
+              </a:ext>
+            </a:extLst>
+          </p:cNvPr>
           <p:cNvSpPr>
             <a:spLocks noGrp="1"/>
           </p:cNvSpPr>
@@ -1688,7 +1860,13 @@
       </p:sp>
       <p:sp>
         <p:nvSpPr>
-          <p:cNvPr id="9" name="Slide Number Placeholder 8"/>
+          <p:cNvPr id="9" name="Slide Number Placeholder 8">
+            <a:extLst>
+              <a:ext uri="{FF2B5EF4-FFF2-40B4-BE49-F238E27FC236}">
+                <a16:creationId xmlns:a16="http://schemas.microsoft.com/office/drawing/2014/main" id="{BC24ED03-8A6F-4A0A-AA3D-C919E6DDB302}"/>
+              </a:ext>
+            </a:extLst>
+          </p:cNvPr>
           <p:cNvSpPr>
             <a:spLocks noGrp="1"/>
           </p:cNvSpPr>
@@ -1709,33 +1887,10 @@
           </a:p>
         </p:txBody>
       </p:sp>
-      <p:sp>
-        <p:nvSpPr>
-          <p:cNvPr id="10" name="Title 9"/>
-          <p:cNvSpPr>
-            <a:spLocks noGrp="1"/>
-          </p:cNvSpPr>
-          <p:nvPr>
-            <p:ph type="title"/>
-          </p:nvPr>
-        </p:nvSpPr>
-        <p:spPr/>
-        <p:txBody>
-          <a:bodyPr/>
-          <a:lstStyle/>
-          <a:p>
-            <a:r>
-              <a:rPr lang="en-US"/>
-              <a:t>Click to edit Master title style</a:t>
-            </a:r>
-            <a:endParaRPr lang="en-US" dirty="0"/>
-          </a:p>
-        </p:txBody>
-      </p:sp>
     </p:spTree>
     <p:extLst>
       <p:ext uri="{BB962C8B-B14F-4D97-AF65-F5344CB8AC3E}">
-        <p14:creationId xmlns:p14="http://schemas.microsoft.com/office/powerpoint/2010/main" val="2424440935"/>
+        <p14:creationId xmlns:p14="http://schemas.microsoft.com/office/powerpoint/2010/main" val="860667361"/>
       </p:ext>
     </p:extLst>
   </p:cSld>
@@ -1764,7 +1919,13 @@
       </p:grpSpPr>
       <p:sp>
         <p:nvSpPr>
-          <p:cNvPr id="2" name="Title 1"/>
+          <p:cNvPr id="2" name="Title 1">
+            <a:extLst>
+              <a:ext uri="{FF2B5EF4-FFF2-40B4-BE49-F238E27FC236}">
+                <a16:creationId xmlns:a16="http://schemas.microsoft.com/office/drawing/2014/main" id="{AD91D051-722A-4E3B-BDD6-0FDF3CB10B8C}"/>
+              </a:ext>
+            </a:extLst>
+          </p:cNvPr>
           <p:cNvSpPr>
             <a:spLocks noGrp="1"/>
           </p:cNvSpPr>
@@ -1781,13 +1942,18 @@
               <a:rPr lang="en-US"/>
               <a:t>Click to edit Master title style</a:t>
             </a:r>
-            <a:endParaRPr lang="en-US" dirty="0"/>
-          </a:p>
-        </p:txBody>
-      </p:sp>
-      <p:sp>
-        <p:nvSpPr>
-          <p:cNvPr id="3" name="Date Placeholder 2"/>
+          </a:p>
+        </p:txBody>
+      </p:sp>
+      <p:sp>
+        <p:nvSpPr>
+          <p:cNvPr id="3" name="Date Placeholder 2">
+            <a:extLst>
+              <a:ext uri="{FF2B5EF4-FFF2-40B4-BE49-F238E27FC236}">
+                <a16:creationId xmlns:a16="http://schemas.microsoft.com/office/drawing/2014/main" id="{A5A9E07C-0C25-4F74-AAA7-9A6D4F49B4AE}"/>
+              </a:ext>
+            </a:extLst>
+          </p:cNvPr>
           <p:cNvSpPr>
             <a:spLocks noGrp="1"/>
           </p:cNvSpPr>
@@ -1802,7 +1968,7 @@
           <a:p>
             <a:fld id="{085C4363-0C8D-4048-885D-EDEB801BB229}" type="datetimeFigureOut">
               <a:rPr lang="en-US" smtClean="0"/>
-              <a:t>10/6/2021</a:t>
+              <a:t>11/19/2021</a:t>
             </a:fld>
             <a:endParaRPr lang="en-US"/>
           </a:p>
@@ -1810,7 +1976,13 @@
       </p:sp>
       <p:sp>
         <p:nvSpPr>
-          <p:cNvPr id="4" name="Footer Placeholder 3"/>
+          <p:cNvPr id="4" name="Footer Placeholder 3">
+            <a:extLst>
+              <a:ext uri="{FF2B5EF4-FFF2-40B4-BE49-F238E27FC236}">
+                <a16:creationId xmlns:a16="http://schemas.microsoft.com/office/drawing/2014/main" id="{0802784F-5EDD-4B9D-ACEC-8A3C1141A0D2}"/>
+              </a:ext>
+            </a:extLst>
+          </p:cNvPr>
           <p:cNvSpPr>
             <a:spLocks noGrp="1"/>
           </p:cNvSpPr>
@@ -1829,7 +2001,13 @@
       </p:sp>
       <p:sp>
         <p:nvSpPr>
-          <p:cNvPr id="5" name="Slide Number Placeholder 4"/>
+          <p:cNvPr id="5" name="Slide Number Placeholder 4">
+            <a:extLst>
+              <a:ext uri="{FF2B5EF4-FFF2-40B4-BE49-F238E27FC236}">
+                <a16:creationId xmlns:a16="http://schemas.microsoft.com/office/drawing/2014/main" id="{1F998A7B-5367-44DA-B786-1F5CF59C91C9}"/>
+              </a:ext>
+            </a:extLst>
+          </p:cNvPr>
           <p:cNvSpPr>
             <a:spLocks noGrp="1"/>
           </p:cNvSpPr>
@@ -1853,7 +2031,7 @@
     </p:spTree>
     <p:extLst>
       <p:ext uri="{BB962C8B-B14F-4D97-AF65-F5344CB8AC3E}">
-        <p14:creationId xmlns:p14="http://schemas.microsoft.com/office/powerpoint/2010/main" val="3426729956"/>
+        <p14:creationId xmlns:p14="http://schemas.microsoft.com/office/powerpoint/2010/main" val="240095013"/>
       </p:ext>
     </p:extLst>
   </p:cSld>
@@ -1882,7 +2060,13 @@
       </p:grpSpPr>
       <p:sp>
         <p:nvSpPr>
-          <p:cNvPr id="2" name="Date Placeholder 1"/>
+          <p:cNvPr id="2" name="Date Placeholder 1">
+            <a:extLst>
+              <a:ext uri="{FF2B5EF4-FFF2-40B4-BE49-F238E27FC236}">
+                <a16:creationId xmlns:a16="http://schemas.microsoft.com/office/drawing/2014/main" id="{0180EAD8-0485-4379-BE81-D40E4EDA9361}"/>
+              </a:ext>
+            </a:extLst>
+          </p:cNvPr>
           <p:cNvSpPr>
             <a:spLocks noGrp="1"/>
           </p:cNvSpPr>
@@ -1897,7 +2081,7 @@
           <a:p>
             <a:fld id="{085C4363-0C8D-4048-885D-EDEB801BB229}" type="datetimeFigureOut">
               <a:rPr lang="en-US" smtClean="0"/>
-              <a:t>10/6/2021</a:t>
+              <a:t>11/19/2021</a:t>
             </a:fld>
             <a:endParaRPr lang="en-US"/>
           </a:p>
@@ -1905,7 +2089,13 @@
       </p:sp>
       <p:sp>
         <p:nvSpPr>
-          <p:cNvPr id="3" name="Footer Placeholder 2"/>
+          <p:cNvPr id="3" name="Footer Placeholder 2">
+            <a:extLst>
+              <a:ext uri="{FF2B5EF4-FFF2-40B4-BE49-F238E27FC236}">
+                <a16:creationId xmlns:a16="http://schemas.microsoft.com/office/drawing/2014/main" id="{0AC0F4DB-10D2-4511-8505-325C3FB12309}"/>
+              </a:ext>
+            </a:extLst>
+          </p:cNvPr>
           <p:cNvSpPr>
             <a:spLocks noGrp="1"/>
           </p:cNvSpPr>
@@ -1924,7 +2114,13 @@
       </p:sp>
       <p:sp>
         <p:nvSpPr>
-          <p:cNvPr id="4" name="Slide Number Placeholder 3"/>
+          <p:cNvPr id="4" name="Slide Number Placeholder 3">
+            <a:extLst>
+              <a:ext uri="{FF2B5EF4-FFF2-40B4-BE49-F238E27FC236}">
+                <a16:creationId xmlns:a16="http://schemas.microsoft.com/office/drawing/2014/main" id="{3B24BA55-6B97-4434-932D-63BFC8C11F7C}"/>
+              </a:ext>
+            </a:extLst>
+          </p:cNvPr>
           <p:cNvSpPr>
             <a:spLocks noGrp="1"/>
           </p:cNvSpPr>
@@ -1948,7 +2144,7 @@
     </p:spTree>
     <p:extLst>
       <p:ext uri="{BB962C8B-B14F-4D97-AF65-F5344CB8AC3E}">
-        <p14:creationId xmlns:p14="http://schemas.microsoft.com/office/powerpoint/2010/main" val="3611371989"/>
+        <p14:creationId xmlns:p14="http://schemas.microsoft.com/office/powerpoint/2010/main" val="147719919"/>
       </p:ext>
     </p:extLst>
   </p:cSld>
@@ -1977,77 +2173,31 @@
       </p:grpSpPr>
       <p:sp>
         <p:nvSpPr>
-          <p:cNvPr id="26" name="Rectangle 25"/>
-          <p:cNvSpPr/>
-          <p:nvPr/>
+          <p:cNvPr id="2" name="Title 1">
+            <a:extLst>
+              <a:ext uri="{FF2B5EF4-FFF2-40B4-BE49-F238E27FC236}">
+                <a16:creationId xmlns:a16="http://schemas.microsoft.com/office/drawing/2014/main" id="{3E7D3756-6CE2-4CE7-A77F-07C5DD74FCD6}"/>
+              </a:ext>
+            </a:extLst>
+          </p:cNvPr>
+          <p:cNvSpPr>
+            <a:spLocks noGrp="1"/>
+          </p:cNvSpPr>
+          <p:nvPr>
+            <p:ph type="title"/>
+          </p:nvPr>
         </p:nvSpPr>
         <p:spPr>
           <a:xfrm>
-            <a:off x="0" y="0"/>
-            <a:ext cx="6096000" cy="6858000"/>
+            <a:off x="839788" y="457200"/>
+            <a:ext cx="3932237" cy="1600200"/>
           </a:xfrm>
-          <a:prstGeom prst="rect">
-            <a:avLst/>
-          </a:prstGeom>
-          <a:solidFill>
-            <a:schemeClr val="accent2"/>
-          </a:solidFill>
-          <a:ln>
-            <a:noFill/>
-          </a:ln>
         </p:spPr>
-        <p:style>
-          <a:lnRef idx="2">
-            <a:schemeClr val="accent1">
-              <a:shade val="50000"/>
-            </a:schemeClr>
-          </a:lnRef>
-          <a:fillRef idx="1">
-            <a:schemeClr val="accent1"/>
-          </a:fillRef>
-          <a:effectRef idx="0">
-            <a:schemeClr val="accent1"/>
-          </a:effectRef>
-          <a:fontRef idx="minor">
-            <a:schemeClr val="lt1"/>
-          </a:fontRef>
-        </p:style>
-      </p:sp>
-      <p:sp>
-        <p:nvSpPr>
-          <p:cNvPr id="2" name="Title 1"/>
-          <p:cNvSpPr>
-            <a:spLocks noGrp="1"/>
-          </p:cNvSpPr>
-          <p:nvPr>
-            <p:ph type="title"/>
-          </p:nvPr>
-        </p:nvSpPr>
-        <p:spPr bwMode="blackWhite">
-          <a:xfrm>
-            <a:off x="804672" y="2243828"/>
-            <a:ext cx="4486656" cy="1141497"/>
-          </a:xfrm>
-          <a:solidFill>
-            <a:srgbClr val="FFFFFF"/>
-          </a:solidFill>
-          <a:ln>
-            <a:solidFill>
-              <a:srgbClr val="404040"/>
-            </a:solidFill>
-          </a:ln>
-        </p:spPr>
-        <p:txBody>
-          <a:bodyPr anchor="ctr" anchorCtr="1">
-            <a:normAutofit/>
-          </a:bodyPr>
+        <p:txBody>
+          <a:bodyPr anchor="b"/>
           <a:lstStyle>
             <a:lvl1pPr>
-              <a:defRPr sz="2200">
-                <a:solidFill>
-                  <a:srgbClr val="262626"/>
-                </a:solidFill>
-              </a:defRPr>
+              <a:defRPr sz="3200"/>
             </a:lvl1pPr>
           </a:lstStyle>
           <a:p>
@@ -2055,13 +2205,18 @@
               <a:rPr lang="en-US"/>
               <a:t>Click to edit Master title style</a:t>
             </a:r>
-            <a:endParaRPr lang="en-US" dirty="0"/>
-          </a:p>
-        </p:txBody>
-      </p:sp>
-      <p:sp>
-        <p:nvSpPr>
-          <p:cNvPr id="3" name="Content Placeholder 2"/>
+          </a:p>
+        </p:txBody>
+      </p:sp>
+      <p:sp>
+        <p:nvSpPr>
+          <p:cNvPr id="3" name="Content Placeholder 2">
+            <a:extLst>
+              <a:ext uri="{FF2B5EF4-FFF2-40B4-BE49-F238E27FC236}">
+                <a16:creationId xmlns:a16="http://schemas.microsoft.com/office/drawing/2014/main" id="{16FA3040-4FC4-48A6-85E9-661E23173C2B}"/>
+              </a:ext>
+            </a:extLst>
+          </p:cNvPr>
           <p:cNvSpPr>
             <a:spLocks noGrp="1"/>
           </p:cNvSpPr>
@@ -2071,61 +2226,39 @@
         </p:nvSpPr>
         <p:spPr>
           <a:xfrm>
-            <a:off x="6736080" y="804672"/>
-            <a:ext cx="4815840" cy="5248656"/>
+            <a:off x="5183188" y="987425"/>
+            <a:ext cx="6172200" cy="4873625"/>
           </a:xfrm>
         </p:spPr>
         <p:txBody>
-          <a:bodyPr>
-            <a:normAutofit/>
-          </a:bodyPr>
+          <a:bodyPr/>
           <a:lstStyle>
             <a:lvl1pPr>
-              <a:defRPr sz="1900">
-                <a:solidFill>
-                  <a:schemeClr val="tx1"/>
-                </a:solidFill>
-              </a:defRPr>
+              <a:defRPr sz="3200"/>
             </a:lvl1pPr>
             <a:lvl2pPr>
-              <a:defRPr sz="1600">
-                <a:solidFill>
-                  <a:schemeClr val="tx1"/>
-                </a:solidFill>
-              </a:defRPr>
+              <a:defRPr sz="2800"/>
             </a:lvl2pPr>
             <a:lvl3pPr>
-              <a:defRPr sz="1600">
-                <a:solidFill>
-                  <a:schemeClr val="tx1"/>
-                </a:solidFill>
-              </a:defRPr>
+              <a:defRPr sz="2400"/>
             </a:lvl3pPr>
             <a:lvl4pPr>
-              <a:defRPr sz="1600">
-                <a:solidFill>
-                  <a:schemeClr val="tx1"/>
-                </a:solidFill>
-              </a:defRPr>
+              <a:defRPr sz="2000"/>
             </a:lvl4pPr>
             <a:lvl5pPr>
-              <a:defRPr sz="1600">
-                <a:solidFill>
-                  <a:schemeClr val="tx1"/>
-                </a:solidFill>
-              </a:defRPr>
+              <a:defRPr sz="2000"/>
             </a:lvl5pPr>
             <a:lvl6pPr>
-              <a:defRPr sz="1600"/>
+              <a:defRPr sz="2000"/>
             </a:lvl6pPr>
             <a:lvl7pPr>
-              <a:defRPr sz="1600"/>
+              <a:defRPr sz="2000"/>
             </a:lvl7pPr>
             <a:lvl8pPr>
-              <a:defRPr sz="1600"/>
+              <a:defRPr sz="2000"/>
             </a:lvl8pPr>
             <a:lvl9pPr>
-              <a:defRPr sz="1600"/>
+              <a:defRPr sz="2000"/>
             </a:lvl9pPr>
           </a:lstStyle>
           <a:p>
@@ -2162,13 +2295,18 @@
               <a:rPr lang="en-US"/>
               <a:t>Fifth level</a:t>
             </a:r>
-            <a:endParaRPr lang="en-US" dirty="0"/>
-          </a:p>
-        </p:txBody>
-      </p:sp>
-      <p:sp>
-        <p:nvSpPr>
-          <p:cNvPr id="4" name="Text Placeholder 3"/>
+          </a:p>
+        </p:txBody>
+      </p:sp>
+      <p:sp>
+        <p:nvSpPr>
+          <p:cNvPr id="4" name="Text Placeholder 3">
+            <a:extLst>
+              <a:ext uri="{FF2B5EF4-FFF2-40B4-BE49-F238E27FC236}">
+                <a16:creationId xmlns:a16="http://schemas.microsoft.com/office/drawing/2014/main" id="{277580DA-5441-4FBC-887C-CFD51DE5529B}"/>
+              </a:ext>
+            </a:extLst>
+          </p:cNvPr>
           <p:cNvSpPr>
             <a:spLocks noGrp="1"/>
           </p:cNvSpPr>
@@ -2178,22 +2316,16 @@
         </p:nvSpPr>
         <p:spPr>
           <a:xfrm>
-            <a:off x="1115568" y="3549918"/>
-            <a:ext cx="3794760" cy="2194036"/>
+            <a:off x="839788" y="2057400"/>
+            <a:ext cx="3932237" cy="3811588"/>
           </a:xfrm>
         </p:spPr>
         <p:txBody>
-          <a:bodyPr anchor="t" anchorCtr="1">
-            <a:normAutofit/>
-          </a:bodyPr>
+          <a:bodyPr/>
           <a:lstStyle>
-            <a:lvl1pPr marL="0" indent="0" algn="ctr">
-              <a:buNone/>
-              <a:defRPr sz="1500">
-                <a:solidFill>
-                  <a:srgbClr val="FFFFFF"/>
-                </a:solidFill>
-              </a:defRPr>
+            <a:lvl1pPr marL="0" indent="0">
+              <a:buNone/>
+              <a:defRPr sz="1600"/>
             </a:lvl1pPr>
             <a:lvl2pPr marL="457200" indent="0">
               <a:buNone/>
@@ -2239,7 +2371,13 @@
       </p:sp>
       <p:sp>
         <p:nvSpPr>
-          <p:cNvPr id="9" name="Date Placeholder 8"/>
+          <p:cNvPr id="5" name="Date Placeholder 4">
+            <a:extLst>
+              <a:ext uri="{FF2B5EF4-FFF2-40B4-BE49-F238E27FC236}">
+                <a16:creationId xmlns:a16="http://schemas.microsoft.com/office/drawing/2014/main" id="{C220AC28-9655-4094-B202-2F407DF4555A}"/>
+              </a:ext>
+            </a:extLst>
+          </p:cNvPr>
           <p:cNvSpPr>
             <a:spLocks noGrp="1"/>
           </p:cNvSpPr>
@@ -2254,7 +2392,7 @@
           <a:p>
             <a:fld id="{085C4363-0C8D-4048-885D-EDEB801BB229}" type="datetimeFigureOut">
               <a:rPr lang="en-US" smtClean="0"/>
-              <a:t>10/6/2021</a:t>
+              <a:t>11/19/2021</a:t>
             </a:fld>
             <a:endParaRPr lang="en-US"/>
           </a:p>
@@ -2262,7 +2400,13 @@
       </p:sp>
       <p:sp>
         <p:nvSpPr>
-          <p:cNvPr id="10" name="Footer Placeholder 9"/>
+          <p:cNvPr id="6" name="Footer Placeholder 5">
+            <a:extLst>
+              <a:ext uri="{FF2B5EF4-FFF2-40B4-BE49-F238E27FC236}">
+                <a16:creationId xmlns:a16="http://schemas.microsoft.com/office/drawing/2014/main" id="{32640FC7-0A2F-43E8-8880-7ED0B874E5A2}"/>
+              </a:ext>
+            </a:extLst>
+          </p:cNvPr>
           <p:cNvSpPr>
             <a:spLocks noGrp="1"/>
           </p:cNvSpPr>
@@ -2270,25 +2414,10 @@
             <p:ph type="ftr" sz="quarter" idx="11"/>
           </p:nvPr>
         </p:nvSpPr>
-        <p:spPr>
-          <a:xfrm>
-            <a:off x="804672" y="6236208"/>
-            <a:ext cx="5124797" cy="320040"/>
-          </a:xfrm>
-        </p:spPr>
-        <p:txBody>
-          <a:bodyPr/>
-          <a:lstStyle>
-            <a:lvl1pPr>
-              <a:defRPr>
-                <a:solidFill>
-                  <a:srgbClr val="FFFFFF">
-                    <a:alpha val="70000"/>
-                  </a:srgbClr>
-                </a:solidFill>
-              </a:defRPr>
-            </a:lvl1pPr>
-          </a:lstStyle>
+        <p:spPr/>
+        <p:txBody>
+          <a:bodyPr/>
+          <a:lstStyle/>
           <a:p>
             <a:endParaRPr lang="en-US"/>
           </a:p>
@@ -2296,7 +2425,13 @@
       </p:sp>
       <p:sp>
         <p:nvSpPr>
-          <p:cNvPr id="11" name="Slide Number Placeholder 10"/>
+          <p:cNvPr id="7" name="Slide Number Placeholder 6">
+            <a:extLst>
+              <a:ext uri="{FF2B5EF4-FFF2-40B4-BE49-F238E27FC236}">
+                <a16:creationId xmlns:a16="http://schemas.microsoft.com/office/drawing/2014/main" id="{8F9ABF82-3750-4DA3-AA01-CFECC63F3C80}"/>
+              </a:ext>
+            </a:extLst>
+          </p:cNvPr>
           <p:cNvSpPr>
             <a:spLocks noGrp="1"/>
           </p:cNvSpPr>
@@ -2320,7 +2455,7 @@
     </p:spTree>
     <p:extLst>
       <p:ext uri="{BB962C8B-B14F-4D97-AF65-F5344CB8AC3E}">
-        <p14:creationId xmlns:p14="http://schemas.microsoft.com/office/powerpoint/2010/main" val="1434154550"/>
+        <p14:creationId xmlns:p14="http://schemas.microsoft.com/office/powerpoint/2010/main" val="3952246399"/>
       </p:ext>
     </p:extLst>
   </p:cSld>
@@ -2349,77 +2484,31 @@
       </p:grpSpPr>
       <p:sp>
         <p:nvSpPr>
-          <p:cNvPr id="18" name="Rectangle 17"/>
-          <p:cNvSpPr/>
-          <p:nvPr/>
+          <p:cNvPr id="2" name="Title 1">
+            <a:extLst>
+              <a:ext uri="{FF2B5EF4-FFF2-40B4-BE49-F238E27FC236}">
+                <a16:creationId xmlns:a16="http://schemas.microsoft.com/office/drawing/2014/main" id="{04F4A127-CD34-40E3-A67D-D7AB56C0A769}"/>
+              </a:ext>
+            </a:extLst>
+          </p:cNvPr>
+          <p:cNvSpPr>
+            <a:spLocks noGrp="1"/>
+          </p:cNvSpPr>
+          <p:nvPr>
+            <p:ph type="title"/>
+          </p:nvPr>
         </p:nvSpPr>
         <p:spPr>
           <a:xfrm>
-            <a:off x="0" y="0"/>
-            <a:ext cx="6095999" cy="6858000"/>
+            <a:off x="839788" y="457200"/>
+            <a:ext cx="3932237" cy="1600200"/>
           </a:xfrm>
-          <a:prstGeom prst="rect">
-            <a:avLst/>
-          </a:prstGeom>
-          <a:solidFill>
-            <a:schemeClr val="accent2"/>
-          </a:solidFill>
-          <a:ln>
-            <a:noFill/>
-          </a:ln>
         </p:spPr>
-        <p:style>
-          <a:lnRef idx="2">
-            <a:schemeClr val="accent1">
-              <a:shade val="50000"/>
-            </a:schemeClr>
-          </a:lnRef>
-          <a:fillRef idx="1">
-            <a:schemeClr val="accent1"/>
-          </a:fillRef>
-          <a:effectRef idx="0">
-            <a:schemeClr val="accent1"/>
-          </a:effectRef>
-          <a:fontRef idx="minor">
-            <a:schemeClr val="lt1"/>
-          </a:fontRef>
-        </p:style>
-      </p:sp>
-      <p:sp>
-        <p:nvSpPr>
-          <p:cNvPr id="2" name="Title 1"/>
-          <p:cNvSpPr>
-            <a:spLocks noGrp="1"/>
-          </p:cNvSpPr>
-          <p:nvPr>
-            <p:ph type="title"/>
-          </p:nvPr>
-        </p:nvSpPr>
-        <p:spPr bwMode="blackWhite">
-          <a:xfrm>
-            <a:off x="808523" y="2243828"/>
-            <a:ext cx="4494998" cy="1134640"/>
-          </a:xfrm>
-          <a:solidFill>
-            <a:srgbClr val="FFFFFF"/>
-          </a:solidFill>
-          <a:ln>
-            <a:solidFill>
-              <a:srgbClr val="404040"/>
-            </a:solidFill>
-          </a:ln>
-        </p:spPr>
-        <p:txBody>
-          <a:bodyPr anchor="ctr" anchorCtr="1">
-            <a:noAutofit/>
-          </a:bodyPr>
+        <p:txBody>
+          <a:bodyPr anchor="b"/>
           <a:lstStyle>
             <a:lvl1pPr>
-              <a:defRPr sz="2200">
-                <a:solidFill>
-                  <a:srgbClr val="262626"/>
-                </a:solidFill>
-              </a:defRPr>
+              <a:defRPr sz="3200"/>
             </a:lvl1pPr>
           </a:lstStyle>
           <a:p>
@@ -2427,15 +2516,20 @@
               <a:rPr lang="en-US"/>
               <a:t>Click to edit Master title style</a:t>
             </a:r>
-            <a:endParaRPr lang="en-US" dirty="0"/>
-          </a:p>
-        </p:txBody>
-      </p:sp>
-      <p:sp>
-        <p:nvSpPr>
-          <p:cNvPr id="3" name="Picture Placeholder 2"/>
-          <p:cNvSpPr>
-            <a:spLocks noGrp="1" noChangeAspect="1"/>
+          </a:p>
+        </p:txBody>
+      </p:sp>
+      <p:sp>
+        <p:nvSpPr>
+          <p:cNvPr id="3" name="Picture Placeholder 2">
+            <a:extLst>
+              <a:ext uri="{FF2B5EF4-FFF2-40B4-BE49-F238E27FC236}">
+                <a16:creationId xmlns:a16="http://schemas.microsoft.com/office/drawing/2014/main" id="{490502B8-4BE8-4A71-8862-95D49D818371}"/>
+              </a:ext>
+            </a:extLst>
+          </p:cNvPr>
+          <p:cNvSpPr>
+            <a:spLocks noGrp="1"/>
           </p:cNvSpPr>
           <p:nvPr>
             <p:ph type="pic" idx="1"/>
@@ -2443,28 +2537,16 @@
         </p:nvSpPr>
         <p:spPr>
           <a:xfrm>
-            <a:off x="6095999" y="0"/>
-            <a:ext cx="6102097" cy="6858000"/>
+            <a:off x="5183188" y="987425"/>
+            <a:ext cx="6172200" cy="4873625"/>
           </a:xfrm>
-          <a:solidFill>
-            <a:schemeClr val="bg1">
-              <a:lumMod val="75000"/>
-            </a:schemeClr>
-          </a:solidFill>
         </p:spPr>
         <p:txBody>
-          <a:bodyPr anchor="t"/>
+          <a:bodyPr/>
           <a:lstStyle>
             <a:lvl1pPr marL="0" indent="0">
               <a:buNone/>
-              <a:defRPr sz="3200">
-                <a:solidFill>
-                  <a:schemeClr val="bg1">
-                    <a:lumMod val="85000"/>
-                    <a:lumOff val="15000"/>
-                  </a:schemeClr>
-                </a:solidFill>
-              </a:defRPr>
+              <a:defRPr sz="3200"/>
             </a:lvl1pPr>
             <a:lvl2pPr marL="457200" indent="0">
               <a:buNone/>
@@ -2500,17 +2582,19 @@
             </a:lvl9pPr>
           </a:lstStyle>
           <a:p>
-            <a:r>
-              <a:rPr lang="en-US"/>
-              <a:t>Click icon to add picture</a:t>
-            </a:r>
-            <a:endParaRPr lang="en-US" dirty="0"/>
-          </a:p>
-        </p:txBody>
-      </p:sp>
-      <p:sp>
-        <p:nvSpPr>
-          <p:cNvPr id="4" name="Text Placeholder 3"/>
+            <a:endParaRPr lang="en-US"/>
+          </a:p>
+        </p:txBody>
+      </p:sp>
+      <p:sp>
+        <p:nvSpPr>
+          <p:cNvPr id="4" name="Text Placeholder 3">
+            <a:extLst>
+              <a:ext uri="{FF2B5EF4-FFF2-40B4-BE49-F238E27FC236}">
+                <a16:creationId xmlns:a16="http://schemas.microsoft.com/office/drawing/2014/main" id="{DC2385C1-23BE-40FB-AABE-2F98573078A5}"/>
+              </a:ext>
+            </a:extLst>
+          </p:cNvPr>
           <p:cNvSpPr>
             <a:spLocks noGrp="1"/>
           </p:cNvSpPr>
@@ -2520,22 +2604,16 @@
         </p:nvSpPr>
         <p:spPr>
           <a:xfrm>
-            <a:off x="1115568" y="3549918"/>
-            <a:ext cx="3794760" cy="2194037"/>
+            <a:off x="839788" y="2057400"/>
+            <a:ext cx="3932237" cy="3811588"/>
           </a:xfrm>
         </p:spPr>
         <p:txBody>
-          <a:bodyPr anchor="t" anchorCtr="1">
-            <a:normAutofit/>
-          </a:bodyPr>
+          <a:bodyPr/>
           <a:lstStyle>
-            <a:lvl1pPr marL="0" indent="0" algn="ctr">
-              <a:buNone/>
-              <a:defRPr sz="1500">
-                <a:solidFill>
-                  <a:srgbClr val="FFFFFF"/>
-                </a:solidFill>
-              </a:defRPr>
+            <a:lvl1pPr marL="0" indent="0">
+              <a:buNone/>
+              <a:defRPr sz="1600"/>
             </a:lvl1pPr>
             <a:lvl2pPr marL="457200" indent="0">
               <a:buNone/>
@@ -2581,7 +2659,13 @@
       </p:sp>
       <p:sp>
         <p:nvSpPr>
-          <p:cNvPr id="8" name="Date Placeholder 7"/>
+          <p:cNvPr id="5" name="Date Placeholder 4">
+            <a:extLst>
+              <a:ext uri="{FF2B5EF4-FFF2-40B4-BE49-F238E27FC236}">
+                <a16:creationId xmlns:a16="http://schemas.microsoft.com/office/drawing/2014/main" id="{A2AE39BC-ACD8-4BE2-9DF5-31ED835C3320}"/>
+              </a:ext>
+            </a:extLst>
+          </p:cNvPr>
           <p:cNvSpPr>
             <a:spLocks noGrp="1"/>
           </p:cNvSpPr>
@@ -2592,26 +2676,11 @@
         <p:spPr/>
         <p:txBody>
           <a:bodyPr/>
-          <a:lstStyle>
-            <a:lvl1pPr>
-              <a:defRPr>
-                <a:solidFill>
-                  <a:srgbClr val="FFFFFF"/>
-                </a:solidFill>
-                <a:effectLst>
-                  <a:outerShdw blurRad="50800" dist="38100" dir="2700000" algn="tl" rotWithShape="0">
-                    <a:prstClr val="black">
-                      <a:alpha val="43000"/>
-                    </a:prstClr>
-                  </a:outerShdw>
-                </a:effectLst>
-              </a:defRPr>
-            </a:lvl1pPr>
-          </a:lstStyle>
+          <a:lstStyle/>
           <a:p>
             <a:fld id="{085C4363-0C8D-4048-885D-EDEB801BB229}" type="datetimeFigureOut">
               <a:rPr lang="en-US" smtClean="0"/>
-              <a:t>10/6/2021</a:t>
+              <a:t>11/19/2021</a:t>
             </a:fld>
             <a:endParaRPr lang="en-US"/>
           </a:p>
@@ -2619,7 +2688,13 @@
       </p:sp>
       <p:sp>
         <p:nvSpPr>
-          <p:cNvPr id="9" name="Footer Placeholder 8"/>
+          <p:cNvPr id="6" name="Footer Placeholder 5">
+            <a:extLst>
+              <a:ext uri="{FF2B5EF4-FFF2-40B4-BE49-F238E27FC236}">
+                <a16:creationId xmlns:a16="http://schemas.microsoft.com/office/drawing/2014/main" id="{52F2C20B-482B-4493-9212-BB907BEAD829}"/>
+              </a:ext>
+            </a:extLst>
+          </p:cNvPr>
           <p:cNvSpPr>
             <a:spLocks noGrp="1"/>
           </p:cNvSpPr>
@@ -2627,25 +2702,10 @@
             <p:ph type="ftr" sz="quarter" idx="11"/>
           </p:nvPr>
         </p:nvSpPr>
-        <p:spPr>
-          <a:xfrm>
-            <a:off x="804672" y="6236208"/>
-            <a:ext cx="5124797" cy="320040"/>
-          </a:xfrm>
-        </p:spPr>
-        <p:txBody>
-          <a:bodyPr/>
-          <a:lstStyle>
-            <a:lvl1pPr>
-              <a:defRPr>
-                <a:solidFill>
-                  <a:srgbClr val="FFFFFF">
-                    <a:alpha val="70000"/>
-                  </a:srgbClr>
-                </a:solidFill>
-              </a:defRPr>
-            </a:lvl1pPr>
-          </a:lstStyle>
+        <p:spPr/>
+        <p:txBody>
+          <a:bodyPr/>
+          <a:lstStyle/>
           <a:p>
             <a:endParaRPr lang="en-US"/>
           </a:p>
@@ -2653,7 +2713,13 @@
       </p:sp>
       <p:sp>
         <p:nvSpPr>
-          <p:cNvPr id="10" name="Slide Number Placeholder 9"/>
+          <p:cNvPr id="7" name="Slide Number Placeholder 6">
+            <a:extLst>
+              <a:ext uri="{FF2B5EF4-FFF2-40B4-BE49-F238E27FC236}">
+                <a16:creationId xmlns:a16="http://schemas.microsoft.com/office/drawing/2014/main" id="{E572AD85-EF63-4CDF-9C3C-5895E12279C5}"/>
+              </a:ext>
+            </a:extLst>
+          </p:cNvPr>
           <p:cNvSpPr>
             <a:spLocks noGrp="1"/>
           </p:cNvSpPr>
@@ -2677,7 +2743,7 @@
     </p:spTree>
     <p:extLst>
       <p:ext uri="{BB962C8B-B14F-4D97-AF65-F5344CB8AC3E}">
-        <p14:creationId xmlns:p14="http://schemas.microsoft.com/office/powerpoint/2010/main" val="84903696"/>
+        <p14:creationId xmlns:p14="http://schemas.microsoft.com/office/powerpoint/2010/main" val="3221352238"/>
       </p:ext>
     </p:extLst>
   </p:cSld>
@@ -2691,14 +2757,9 @@
 <p:sldMaster xmlns:a="http://schemas.openxmlformats.org/drawingml/2006/main" xmlns:r="http://schemas.openxmlformats.org/officeDocument/2006/relationships" xmlns:p="http://schemas.openxmlformats.org/presentationml/2006/main">
   <p:cSld>
     <p:bg>
-      <p:bgPr>
-        <a:solidFill>
-          <a:schemeClr val="bg1">
-            <a:lumMod val="95000"/>
-          </a:schemeClr>
-        </a:solidFill>
-        <a:effectLst/>
-      </p:bgPr>
+      <p:bgRef idx="1001">
+        <a:schemeClr val="bg1"/>
+      </p:bgRef>
     </p:bg>
     <p:spTree>
       <p:nvGrpSpPr>
@@ -2716,135 +2777,142 @@
       </p:grpSpPr>
       <p:sp>
         <p:nvSpPr>
-          <p:cNvPr id="2" name="Title Placeholder 1"/>
+          <p:cNvPr id="2" name="Title Placeholder 1">
+            <a:extLst>
+              <a:ext uri="{FF2B5EF4-FFF2-40B4-BE49-F238E27FC236}">
+                <a16:creationId xmlns:a16="http://schemas.microsoft.com/office/drawing/2014/main" id="{EF34E598-ADAD-4D9D-9AEE-03798DB56640}"/>
+              </a:ext>
+            </a:extLst>
+          </p:cNvPr>
           <p:cNvSpPr>
             <a:spLocks noGrp="1"/>
           </p:cNvSpPr>
           <p:nvPr>
             <p:ph type="title"/>
-          </p:nvPr>
-        </p:nvSpPr>
-        <p:spPr bwMode="black">
-          <a:xfrm>
-            <a:off x="2231136" y="964692"/>
-            <a:ext cx="7729728" cy="1188720"/>
-          </a:xfrm>
-          <a:prstGeom prst="rect">
-            <a:avLst/>
-          </a:prstGeom>
-          <a:solidFill>
-            <a:srgbClr val="FFFFFF"/>
-          </a:solidFill>
-          <a:ln w="31750" cap="sq">
-            <a:solidFill>
-              <a:srgbClr val="404040"/>
-            </a:solidFill>
-            <a:miter lim="800000"/>
-          </a:ln>
-        </p:spPr>
-        <p:txBody>
-          <a:bodyPr vert="horz" lIns="182880" tIns="182880" rIns="182880" bIns="182880" rtlCol="0" anchor="ctr">
-            <a:normAutofit/>
-          </a:bodyPr>
-          <a:lstStyle/>
-          <a:p>
-            <a:r>
-              <a:rPr lang="en-US"/>
-              <a:t>Click to edit Master title style</a:t>
-            </a:r>
-            <a:endParaRPr lang="en-US" dirty="0"/>
-          </a:p>
-        </p:txBody>
-      </p:sp>
-      <p:sp>
-        <p:nvSpPr>
-          <p:cNvPr id="3" name="Text Placeholder 2"/>
-          <p:cNvSpPr>
-            <a:spLocks noGrp="1"/>
-          </p:cNvSpPr>
-          <p:nvPr>
-            <p:ph type="body" idx="1"/>
           </p:nvPr>
         </p:nvSpPr>
         <p:spPr>
           <a:xfrm>
-            <a:off x="2231136" y="2638044"/>
-            <a:ext cx="7729728" cy="3101983"/>
+            <a:off x="838200" y="365125"/>
+            <a:ext cx="10515600" cy="1325563"/>
           </a:xfrm>
           <a:prstGeom prst="rect">
             <a:avLst/>
           </a:prstGeom>
         </p:spPr>
         <p:txBody>
-          <a:bodyPr vert="horz" lIns="91440" tIns="45720" rIns="91440" bIns="45720" rtlCol="0">
+          <a:bodyPr vert="horz" lIns="91440" tIns="45720" rIns="91440" bIns="45720" rtlCol="0" anchor="ctr">
             <a:normAutofit/>
           </a:bodyPr>
           <a:lstStyle/>
           <a:p>
-            <a:pPr lvl="0"/>
-            <a:r>
-              <a:rPr lang="en-US"/>
-              <a:t>Click to edit Master text styles</a:t>
-            </a:r>
-          </a:p>
-          <a:p>
-            <a:pPr lvl="1"/>
-            <a:r>
-              <a:rPr lang="en-US"/>
-              <a:t>Second level</a:t>
-            </a:r>
-          </a:p>
-          <a:p>
-            <a:pPr lvl="2"/>
-            <a:r>
-              <a:rPr lang="en-US"/>
-              <a:t>Third level</a:t>
-            </a:r>
-          </a:p>
-          <a:p>
-            <a:pPr lvl="3"/>
-            <a:r>
-              <a:rPr lang="en-US"/>
-              <a:t>Fourth level</a:t>
-            </a:r>
-          </a:p>
-          <a:p>
-            <a:pPr lvl="4"/>
-            <a:r>
-              <a:rPr lang="en-US"/>
-              <a:t>Fifth level</a:t>
-            </a:r>
-            <a:endParaRPr lang="en-US" dirty="0"/>
-          </a:p>
-        </p:txBody>
-      </p:sp>
-      <p:sp>
-        <p:nvSpPr>
-          <p:cNvPr id="4" name="Date Placeholder 3"/>
-          <p:cNvSpPr>
-            <a:spLocks noGrp="1"/>
-          </p:cNvSpPr>
-          <p:nvPr>
-            <p:ph type="dt" sz="half" idx="2"/>
+            <a:r>
+              <a:rPr lang="en-US"/>
+              <a:t>Click to edit Master title style</a:t>
+            </a:r>
+          </a:p>
+        </p:txBody>
+      </p:sp>
+      <p:sp>
+        <p:nvSpPr>
+          <p:cNvPr id="3" name="Text Placeholder 2">
+            <a:extLst>
+              <a:ext uri="{FF2B5EF4-FFF2-40B4-BE49-F238E27FC236}">
+                <a16:creationId xmlns:a16="http://schemas.microsoft.com/office/drawing/2014/main" id="{423FB379-197C-4A1C-9046-62F4241989BF}"/>
+              </a:ext>
+            </a:extLst>
+          </p:cNvPr>
+          <p:cNvSpPr>
+            <a:spLocks noGrp="1"/>
+          </p:cNvSpPr>
+          <p:nvPr>
+            <p:ph type="body" idx="1"/>
           </p:nvPr>
         </p:nvSpPr>
         <p:spPr>
           <a:xfrm>
-            <a:off x="7821429" y="6238816"/>
-            <a:ext cx="2753746" cy="323968"/>
+            <a:off x="838200" y="1825625"/>
+            <a:ext cx="10515600" cy="4351338"/>
           </a:xfrm>
           <a:prstGeom prst="rect">
             <a:avLst/>
           </a:prstGeom>
         </p:spPr>
         <p:txBody>
+          <a:bodyPr vert="horz" lIns="91440" tIns="45720" rIns="91440" bIns="45720" rtlCol="0">
+            <a:normAutofit/>
+          </a:bodyPr>
+          <a:lstStyle/>
+          <a:p>
+            <a:pPr lvl="0"/>
+            <a:r>
+              <a:rPr lang="en-US"/>
+              <a:t>Click to edit Master text styles</a:t>
+            </a:r>
+          </a:p>
+          <a:p>
+            <a:pPr lvl="1"/>
+            <a:r>
+              <a:rPr lang="en-US"/>
+              <a:t>Second level</a:t>
+            </a:r>
+          </a:p>
+          <a:p>
+            <a:pPr lvl="2"/>
+            <a:r>
+              <a:rPr lang="en-US"/>
+              <a:t>Third level</a:t>
+            </a:r>
+          </a:p>
+          <a:p>
+            <a:pPr lvl="3"/>
+            <a:r>
+              <a:rPr lang="en-US"/>
+              <a:t>Fourth level</a:t>
+            </a:r>
+          </a:p>
+          <a:p>
+            <a:pPr lvl="4"/>
+            <a:r>
+              <a:rPr lang="en-US"/>
+              <a:t>Fifth level</a:t>
+            </a:r>
+          </a:p>
+        </p:txBody>
+      </p:sp>
+      <p:sp>
+        <p:nvSpPr>
+          <p:cNvPr id="4" name="Date Placeholder 3">
+            <a:extLst>
+              <a:ext uri="{FF2B5EF4-FFF2-40B4-BE49-F238E27FC236}">
+                <a16:creationId xmlns:a16="http://schemas.microsoft.com/office/drawing/2014/main" id="{2EA3BABC-D705-4BD6-BE77-B35C62C242F0}"/>
+              </a:ext>
+            </a:extLst>
+          </p:cNvPr>
+          <p:cNvSpPr>
+            <a:spLocks noGrp="1"/>
+          </p:cNvSpPr>
+          <p:nvPr>
+            <p:ph type="dt" sz="half" idx="2"/>
+          </p:nvPr>
+        </p:nvSpPr>
+        <p:spPr>
+          <a:xfrm>
+            <a:off x="838200" y="6356350"/>
+            <a:ext cx="2743200" cy="365125"/>
+          </a:xfrm>
+          <a:prstGeom prst="rect">
+            <a:avLst/>
+          </a:prstGeom>
+        </p:spPr>
+        <p:txBody>
           <a:bodyPr vert="horz" lIns="91440" tIns="45720" rIns="91440" bIns="45720" rtlCol="0" anchor="ctr"/>
           <a:lstStyle>
-            <a:lvl1pPr algn="r">
-              <a:defRPr sz="1050">
+            <a:lvl1pPr algn="l">
+              <a:defRPr sz="1200">
                 <a:solidFill>
                   <a:schemeClr val="tx1">
-                    <a:alpha val="70000"/>
+                    <a:tint val="75000"/>
                   </a:schemeClr>
                 </a:solidFill>
               </a:defRPr>
@@ -2853,7 +2921,7 @@
           <a:p>
             <a:fld id="{085C4363-0C8D-4048-885D-EDEB801BB229}" type="datetimeFigureOut">
               <a:rPr lang="en-US" smtClean="0"/>
-              <a:t>10/6/2021</a:t>
+              <a:t>11/19/2021</a:t>
             </a:fld>
             <a:endParaRPr lang="en-US"/>
           </a:p>
@@ -2861,7 +2929,13 @@
       </p:sp>
       <p:sp>
         <p:nvSpPr>
-          <p:cNvPr id="5" name="Footer Placeholder 4"/>
+          <p:cNvPr id="5" name="Footer Placeholder 4">
+            <a:extLst>
+              <a:ext uri="{FF2B5EF4-FFF2-40B4-BE49-F238E27FC236}">
+                <a16:creationId xmlns:a16="http://schemas.microsoft.com/office/drawing/2014/main" id="{08FD30B2-B7F3-4C63-B912-269CFC2AE066}"/>
+              </a:ext>
+            </a:extLst>
+          </p:cNvPr>
           <p:cNvSpPr>
             <a:spLocks noGrp="1"/>
           </p:cNvSpPr>
@@ -2871,8 +2945,8 @@
         </p:nvSpPr>
         <p:spPr>
           <a:xfrm>
-            <a:off x="1600200" y="6236208"/>
-            <a:ext cx="5901189" cy="320040"/>
+            <a:off x="4038600" y="6356350"/>
+            <a:ext cx="4114800" cy="365125"/>
           </a:xfrm>
           <a:prstGeom prst="rect">
             <a:avLst/>
@@ -2881,11 +2955,11 @@
         <p:txBody>
           <a:bodyPr vert="horz" lIns="91440" tIns="45720" rIns="91440" bIns="45720" rtlCol="0" anchor="ctr"/>
           <a:lstStyle>
-            <a:lvl1pPr algn="l">
-              <a:defRPr sz="1050">
+            <a:lvl1pPr algn="ctr">
+              <a:defRPr sz="1200">
                 <a:solidFill>
                   <a:schemeClr val="tx1">
-                    <a:alpha val="70000"/>
+                    <a:tint val="75000"/>
                   </a:schemeClr>
                 </a:solidFill>
               </a:defRPr>
@@ -2898,7 +2972,13 @@
       </p:sp>
       <p:sp>
         <p:nvSpPr>
-          <p:cNvPr id="6" name="Slide Number Placeholder 5"/>
+          <p:cNvPr id="6" name="Slide Number Placeholder 5">
+            <a:extLst>
+              <a:ext uri="{FF2B5EF4-FFF2-40B4-BE49-F238E27FC236}">
+                <a16:creationId xmlns:a16="http://schemas.microsoft.com/office/drawing/2014/main" id="{ED8517B4-50EF-4598-81A2-8AC8AD50DCBC}"/>
+              </a:ext>
+            </a:extLst>
+          </p:cNvPr>
           <p:cNvSpPr>
             <a:spLocks noGrp="1"/>
           </p:cNvSpPr>
@@ -2908,27 +2988,22 @@
         </p:nvSpPr>
         <p:spPr>
           <a:xfrm>
-            <a:off x="10758922" y="6217920"/>
-            <a:ext cx="365760" cy="365760"/>
+            <a:off x="8610600" y="6356350"/>
+            <a:ext cx="2743200" cy="365125"/>
           </a:xfrm>
-          <a:prstGeom prst="ellipse">
+          <a:prstGeom prst="rect">
             <a:avLst/>
           </a:prstGeom>
-          <a:solidFill>
-            <a:srgbClr val="1D1D1D">
-              <a:alpha val="70000"/>
-            </a:srgbClr>
-          </a:solidFill>
         </p:spPr>
         <p:txBody>
-          <a:bodyPr vert="horz" lIns="18288" tIns="45720" rIns="18288" bIns="45720" rtlCol="0" anchor="ctr">
-            <a:noAutofit/>
-          </a:bodyPr>
+          <a:bodyPr vert="horz" lIns="91440" tIns="45720" rIns="91440" bIns="45720" rtlCol="0" anchor="ctr"/>
           <a:lstStyle>
-            <a:lvl1pPr algn="ctr">
-              <a:defRPr sz="1100" spc="0" baseline="0">
+            <a:lvl1pPr algn="r">
+              <a:defRPr sz="1200">
                 <a:solidFill>
-                  <a:srgbClr val="FFFFFF"/>
+                  <a:schemeClr val="tx1">
+                    <a:tint val="75000"/>
+                  </a:schemeClr>
                 </a:solidFill>
               </a:defRPr>
             </a:lvl1pPr>
@@ -2945,27 +3020,27 @@
     </p:spTree>
     <p:extLst>
       <p:ext uri="{BB962C8B-B14F-4D97-AF65-F5344CB8AC3E}">
-        <p14:creationId xmlns:p14="http://schemas.microsoft.com/office/powerpoint/2010/main" val="3675411500"/>
+        <p14:creationId xmlns:p14="http://schemas.microsoft.com/office/powerpoint/2010/main" val="753758705"/>
       </p:ext>
     </p:extLst>
   </p:cSld>
   <p:clrMap bg1="lt1" tx1="dk1" bg2="lt2" tx2="dk2" accent1="accent1" accent2="accent2" accent3="accent3" accent4="accent4" accent5="accent5" accent6="accent6" hlink="hlink" folHlink="folHlink"/>
   <p:sldLayoutIdLst>
-    <p:sldLayoutId id="2147483661" r:id="rId1"/>
-    <p:sldLayoutId id="2147483662" r:id="rId2"/>
-    <p:sldLayoutId id="2147483663" r:id="rId3"/>
-    <p:sldLayoutId id="2147483664" r:id="rId4"/>
-    <p:sldLayoutId id="2147483665" r:id="rId5"/>
-    <p:sldLayoutId id="2147483666" r:id="rId6"/>
-    <p:sldLayoutId id="2147483667" r:id="rId7"/>
-    <p:sldLayoutId id="2147483668" r:id="rId8"/>
-    <p:sldLayoutId id="2147483669" r:id="rId9"/>
-    <p:sldLayoutId id="2147483670" r:id="rId10"/>
-    <p:sldLayoutId id="2147483671" r:id="rId11"/>
+    <p:sldLayoutId id="2147483673" r:id="rId1"/>
+    <p:sldLayoutId id="2147483674" r:id="rId2"/>
+    <p:sldLayoutId id="2147483675" r:id="rId3"/>
+    <p:sldLayoutId id="2147483676" r:id="rId4"/>
+    <p:sldLayoutId id="2147483677" r:id="rId5"/>
+    <p:sldLayoutId id="2147483678" r:id="rId6"/>
+    <p:sldLayoutId id="2147483679" r:id="rId7"/>
+    <p:sldLayoutId id="2147483680" r:id="rId8"/>
+    <p:sldLayoutId id="2147483681" r:id="rId9"/>
+    <p:sldLayoutId id="2147483682" r:id="rId10"/>
+    <p:sldLayoutId id="2147483683" r:id="rId11"/>
   </p:sldLayoutIdLst>
   <p:txStyles>
     <p:titleStyle>
-      <a:lvl1pPr algn="ctr" defTabSz="914400" rtl="0" eaLnBrk="1" latinLnBrk="0" hangingPunct="1">
+      <a:lvl1pPr algn="l" defTabSz="914400" rtl="0" eaLnBrk="1" latinLnBrk="0" hangingPunct="1">
         <a:lnSpc>
           <a:spcPct val="90000"/>
         </a:lnSpc>
@@ -2973,9 +3048,9 @@
           <a:spcPct val="0"/>
         </a:spcBef>
         <a:buNone/>
-        <a:defRPr sz="2800" kern="1200" cap="all" spc="200" baseline="0">
+        <a:defRPr sz="4400" kern="1200">
           <a:solidFill>
-            <a:srgbClr val="262626"/>
+            <a:schemeClr val="tx1"/>
           </a:solidFill>
           <a:latin typeface="+mj-lt"/>
           <a:ea typeface="+mj-ea"/>
@@ -2986,137 +3061,104 @@
     <p:bodyStyle>
       <a:lvl1pPr marL="228600" indent="-228600" algn="l" defTabSz="914400" rtl="0" eaLnBrk="1" latinLnBrk="0" hangingPunct="1">
         <a:lnSpc>
-          <a:spcPct val="100000"/>
+          <a:spcPct val="90000"/>
         </a:lnSpc>
         <a:spcBef>
           <a:spcPts val="1000"/>
         </a:spcBef>
-        <a:buClr>
-          <a:schemeClr val="accent2"/>
-        </a:buClr>
         <a:buFont typeface="Arial" panose="020B0604020202020204" pitchFamily="34" charset="0"/>
         <a:buChar char="•"/>
-        <a:defRPr sz="1800" kern="1200">
+        <a:defRPr sz="2800" kern="1200">
           <a:solidFill>
-            <a:schemeClr val="tx1">
-              <a:lumMod val="85000"/>
-              <a:lumOff val="15000"/>
-            </a:schemeClr>
+            <a:schemeClr val="tx1"/>
           </a:solidFill>
           <a:latin typeface="+mn-lt"/>
           <a:ea typeface="+mn-ea"/>
           <a:cs typeface="+mn-cs"/>
         </a:defRPr>
       </a:lvl1pPr>
-      <a:lvl2pPr marL="457200" indent="-228600" algn="l" defTabSz="914400" rtl="0" eaLnBrk="1" latinLnBrk="0" hangingPunct="1">
+      <a:lvl2pPr marL="685800" indent="-228600" algn="l" defTabSz="914400" rtl="0" eaLnBrk="1" latinLnBrk="0" hangingPunct="1">
         <a:lnSpc>
-          <a:spcPct val="100000"/>
+          <a:spcPct val="90000"/>
         </a:lnSpc>
         <a:spcBef>
-          <a:spcPts val="1000"/>
+          <a:spcPts val="500"/>
         </a:spcBef>
-        <a:buClr>
-          <a:schemeClr val="accent2"/>
-        </a:buClr>
         <a:buFont typeface="Arial" panose="020B0604020202020204" pitchFamily="34" charset="0"/>
         <a:buChar char="•"/>
-        <a:defRPr sz="1600" kern="1200">
+        <a:defRPr sz="2400" kern="1200">
           <a:solidFill>
-            <a:schemeClr val="tx1">
-              <a:lumMod val="85000"/>
-              <a:lumOff val="15000"/>
-            </a:schemeClr>
+            <a:schemeClr val="tx1"/>
           </a:solidFill>
           <a:latin typeface="+mn-lt"/>
           <a:ea typeface="+mn-ea"/>
           <a:cs typeface="+mn-cs"/>
         </a:defRPr>
       </a:lvl2pPr>
-      <a:lvl3pPr marL="685800" indent="-228600" algn="l" defTabSz="914400" rtl="0" eaLnBrk="1" latinLnBrk="0" hangingPunct="1">
+      <a:lvl3pPr marL="1143000" indent="-228600" algn="l" defTabSz="914400" rtl="0" eaLnBrk="1" latinLnBrk="0" hangingPunct="1">
         <a:lnSpc>
-          <a:spcPct val="100000"/>
+          <a:spcPct val="90000"/>
         </a:lnSpc>
         <a:spcBef>
-          <a:spcPts val="1000"/>
+          <a:spcPts val="500"/>
         </a:spcBef>
-        <a:buClr>
-          <a:schemeClr val="accent2"/>
-        </a:buClr>
         <a:buFont typeface="Arial" panose="020B0604020202020204" pitchFamily="34" charset="0"/>
         <a:buChar char="•"/>
-        <a:defRPr sz="1600" kern="1200">
+        <a:defRPr sz="2000" kern="1200">
           <a:solidFill>
-            <a:schemeClr val="tx1">
-              <a:lumMod val="85000"/>
-              <a:lumOff val="15000"/>
-            </a:schemeClr>
+            <a:schemeClr val="tx1"/>
           </a:solidFill>
           <a:latin typeface="+mn-lt"/>
           <a:ea typeface="+mn-ea"/>
           <a:cs typeface="+mn-cs"/>
         </a:defRPr>
       </a:lvl3pPr>
-      <a:lvl4pPr marL="914400" indent="-228600" algn="l" defTabSz="914400" rtl="0" eaLnBrk="1" latinLnBrk="0" hangingPunct="1">
+      <a:lvl4pPr marL="1600200" indent="-228600" algn="l" defTabSz="914400" rtl="0" eaLnBrk="1" latinLnBrk="0" hangingPunct="1">
         <a:lnSpc>
-          <a:spcPct val="100000"/>
+          <a:spcPct val="90000"/>
         </a:lnSpc>
         <a:spcBef>
-          <a:spcPts val="1000"/>
+          <a:spcPts val="500"/>
         </a:spcBef>
-        <a:buClr>
-          <a:schemeClr val="accent2"/>
-        </a:buClr>
         <a:buFont typeface="Arial" panose="020B0604020202020204" pitchFamily="34" charset="0"/>
         <a:buChar char="•"/>
-        <a:defRPr sz="1600" kern="1200">
+        <a:defRPr sz="1800" kern="1200">
           <a:solidFill>
-            <a:schemeClr val="tx1">
-              <a:lumMod val="85000"/>
-              <a:lumOff val="15000"/>
-            </a:schemeClr>
+            <a:schemeClr val="tx1"/>
           </a:solidFill>
           <a:latin typeface="+mn-lt"/>
           <a:ea typeface="+mn-ea"/>
           <a:cs typeface="+mn-cs"/>
         </a:defRPr>
       </a:lvl4pPr>
-      <a:lvl5pPr marL="1143000" indent="-228600" algn="l" defTabSz="914400" rtl="0" eaLnBrk="1" latinLnBrk="0" hangingPunct="1">
+      <a:lvl5pPr marL="2057400" indent="-228600" algn="l" defTabSz="914400" rtl="0" eaLnBrk="1" latinLnBrk="0" hangingPunct="1">
         <a:lnSpc>
-          <a:spcPct val="100000"/>
+          <a:spcPct val="90000"/>
         </a:lnSpc>
         <a:spcBef>
-          <a:spcPts val="1000"/>
+          <a:spcPts val="500"/>
         </a:spcBef>
-        <a:buClr>
-          <a:schemeClr val="accent2"/>
-        </a:buClr>
         <a:buFont typeface="Arial" panose="020B0604020202020204" pitchFamily="34" charset="0"/>
         <a:buChar char="•"/>
-        <a:defRPr sz="1600" kern="1200">
+        <a:defRPr sz="1800" kern="1200">
           <a:solidFill>
-            <a:schemeClr val="tx1">
-              <a:lumMod val="85000"/>
-              <a:lumOff val="15000"/>
-            </a:schemeClr>
+            <a:schemeClr val="tx1"/>
           </a:solidFill>
           <a:latin typeface="+mn-lt"/>
           <a:ea typeface="+mn-ea"/>
           <a:cs typeface="+mn-cs"/>
         </a:defRPr>
       </a:lvl5pPr>
-      <a:lvl6pPr marL="1312863" indent="-228600" algn="l" defTabSz="914400" rtl="0" eaLnBrk="1" latinLnBrk="0" hangingPunct="1">
+      <a:lvl6pPr marL="2514600" indent="-228600" algn="l" defTabSz="914400" rtl="0" eaLnBrk="1" latinLnBrk="0" hangingPunct="1">
         <a:lnSpc>
-          <a:spcPct val="100000"/>
+          <a:spcPct val="90000"/>
         </a:lnSpc>
         <a:spcBef>
-          <a:spcPts val="1000"/>
+          <a:spcPts val="500"/>
         </a:spcBef>
-        <a:buClr>
-          <a:schemeClr val="accent2"/>
-        </a:buClr>
         <a:buFont typeface="Arial" panose="020B0604020202020204" pitchFamily="34" charset="0"/>
         <a:buChar char="•"/>
-        <a:defRPr sz="1600" kern="1200">
+        <a:defRPr sz="1800" kern="1200">
           <a:solidFill>
             <a:schemeClr val="tx1"/>
           </a:solidFill>
@@ -3125,19 +3167,16 @@
           <a:cs typeface="+mn-cs"/>
         </a:defRPr>
       </a:lvl6pPr>
-      <a:lvl7pPr marL="1484313" indent="-228600" algn="l" defTabSz="914400" rtl="0" eaLnBrk="1" latinLnBrk="0" hangingPunct="1">
+      <a:lvl7pPr marL="2971800" indent="-228600" algn="l" defTabSz="914400" rtl="0" eaLnBrk="1" latinLnBrk="0" hangingPunct="1">
         <a:lnSpc>
-          <a:spcPct val="100000"/>
+          <a:spcPct val="90000"/>
         </a:lnSpc>
         <a:spcBef>
-          <a:spcPts val="1000"/>
+          <a:spcPts val="500"/>
         </a:spcBef>
-        <a:buClr>
-          <a:schemeClr val="accent2"/>
-        </a:buClr>
         <a:buFont typeface="Arial" panose="020B0604020202020204" pitchFamily="34" charset="0"/>
         <a:buChar char="•"/>
-        <a:defRPr sz="1600" kern="1200">
+        <a:defRPr sz="1800" kern="1200">
           <a:solidFill>
             <a:schemeClr val="tx1"/>
           </a:solidFill>
@@ -3146,19 +3185,16 @@
           <a:cs typeface="+mn-cs"/>
         </a:defRPr>
       </a:lvl7pPr>
-      <a:lvl8pPr marL="1657350" indent="-228600" algn="l" defTabSz="914400" rtl="0" eaLnBrk="1" latinLnBrk="0" hangingPunct="1">
+      <a:lvl8pPr marL="3429000" indent="-228600" algn="l" defTabSz="914400" rtl="0" eaLnBrk="1" latinLnBrk="0" hangingPunct="1">
         <a:lnSpc>
-          <a:spcPct val="100000"/>
+          <a:spcPct val="90000"/>
         </a:lnSpc>
         <a:spcBef>
-          <a:spcPts val="1000"/>
+          <a:spcPts val="500"/>
         </a:spcBef>
-        <a:buClr>
-          <a:schemeClr val="accent2"/>
-        </a:buClr>
         <a:buFont typeface="Arial" panose="020B0604020202020204" pitchFamily="34" charset="0"/>
         <a:buChar char="•"/>
-        <a:defRPr sz="1600" kern="1200" baseline="0">
+        <a:defRPr sz="1800" kern="1200">
           <a:solidFill>
             <a:schemeClr val="tx1"/>
           </a:solidFill>
@@ -3167,19 +3203,16 @@
           <a:cs typeface="+mn-cs"/>
         </a:defRPr>
       </a:lvl8pPr>
-      <a:lvl9pPr marL="1882775" indent="-228600" algn="l" defTabSz="914400" rtl="0" eaLnBrk="1" latinLnBrk="0" hangingPunct="1">
+      <a:lvl9pPr marL="3886200" indent="-228600" algn="l" defTabSz="914400" rtl="0" eaLnBrk="1" latinLnBrk="0" hangingPunct="1">
         <a:lnSpc>
-          <a:spcPct val="100000"/>
+          <a:spcPct val="90000"/>
         </a:lnSpc>
         <a:spcBef>
-          <a:spcPts val="1000"/>
+          <a:spcPts val="500"/>
         </a:spcBef>
-        <a:buClr>
-          <a:schemeClr val="accent2"/>
-        </a:buClr>
         <a:buFont typeface="Arial" panose="020B0604020202020204" pitchFamily="34" charset="0"/>
         <a:buChar char="•"/>
-        <a:defRPr sz="1600" kern="1200" baseline="0">
+        <a:defRPr sz="1800" kern="1200">
           <a:solidFill>
             <a:schemeClr val="tx1"/>
           </a:solidFill>
@@ -4548,58 +4581,108 @@
 </file>
 
 <file path=ppt/theme/theme1.xml><?xml version="1.0" encoding="utf-8"?>
-<a:theme xmlns:a="http://schemas.openxmlformats.org/drawingml/2006/main" name="Parcel">
+<a:theme xmlns:a="http://schemas.openxmlformats.org/drawingml/2006/main" name="Office Theme">
   <a:themeElements>
-    <a:clrScheme name="Parcel">
+    <a:clrScheme name="Office">
       <a:dk1>
-        <a:srgbClr val="000000"/>
+        <a:sysClr val="windowText" lastClr="000000"/>
       </a:dk1>
       <a:lt1>
-        <a:srgbClr val="FFFFFF"/>
+        <a:sysClr val="window" lastClr="FFFFFF"/>
       </a:lt1>
       <a:dk2>
-        <a:srgbClr val="4A5356"/>
+        <a:srgbClr val="44546A"/>
       </a:dk2>
       <a:lt2>
-        <a:srgbClr val="E8E3CE"/>
+        <a:srgbClr val="E7E6E6"/>
       </a:lt2>
       <a:accent1>
-        <a:srgbClr val="F6A21D"/>
+        <a:srgbClr val="4472C4"/>
       </a:accent1>
       <a:accent2>
-        <a:srgbClr val="9BAFB5"/>
+        <a:srgbClr val="ED7D31"/>
       </a:accent2>
       <a:accent3>
-        <a:srgbClr val="C96731"/>
+        <a:srgbClr val="A5A5A5"/>
       </a:accent3>
       <a:accent4>
-        <a:srgbClr val="9CA383"/>
+        <a:srgbClr val="FFC000"/>
       </a:accent4>
       <a:accent5>
-        <a:srgbClr val="87795D"/>
+        <a:srgbClr val="5B9BD5"/>
       </a:accent5>
       <a:accent6>
-        <a:srgbClr val="A0988C"/>
+        <a:srgbClr val="70AD47"/>
       </a:accent6>
       <a:hlink>
-        <a:srgbClr val="00B0F0"/>
+        <a:srgbClr val="0563C1"/>
       </a:hlink>
       <a:folHlink>
-        <a:srgbClr val="738F97"/>
+        <a:srgbClr val="954F72"/>
       </a:folHlink>
     </a:clrScheme>
-    <a:fontScheme name="Parcel">
+    <a:fontScheme name="Office">
       <a:majorFont>
-        <a:latin typeface="Gill Sans MT" panose="020B0502020104020203"/>
+        <a:latin typeface="Calibri Light" panose="020F0302020204030204"/>
         <a:ea typeface=""/>
         <a:cs typeface=""/>
-        <a:font script="Grek" typeface="Corbel"/>
-        <a:font script="Cyrl" typeface="Corbel"/>
-        <a:font script="Jpan" typeface="HGｺﾞｼｯｸE"/>
-        <a:font script="Hang" typeface="휴먼매직체"/>
-        <a:font script="Hans" typeface="华文中宋"/>
-        <a:font script="Hant" typeface="微軟正黑體"/>
-        <a:font script="Arab" typeface="Majalla UI"/>
+        <a:font script="Jpan" typeface="游ゴシック Light"/>
+        <a:font script="Hang" typeface="맑은 고딕"/>
+        <a:font script="Hans" typeface="等线 Light"/>
+        <a:font script="Hant" typeface="新細明體"/>
+        <a:font script="Arab" typeface="Times New Roman"/>
+        <a:font script="Hebr" typeface="Times New Roman"/>
+        <a:font script="Thai" typeface="Angsana New"/>
+        <a:font script="Ethi" typeface="Nyala"/>
+        <a:font script="Beng" typeface="Vrinda"/>
+        <a:font script="Gujr" typeface="Shruti"/>
+        <a:font script="Khmr" typeface="MoolBoran"/>
+        <a:font script="Knda" typeface="Tunga"/>
+        <a:font script="Guru" typeface="Raavi"/>
+        <a:font script="Cans" typeface="Euphemia"/>
+        <a:font script="Cher" typeface="Plantagenet Cherokee"/>
+        <a:font script="Yiii" typeface="Microsoft Yi Baiti"/>
+        <a:font script="Tibt" typeface="Microsoft Himalaya"/>
+        <a:font script="Thaa" typeface="MV Boli"/>
+        <a:font script="Deva" typeface="Mangal"/>
+        <a:font script="Telu" typeface="Gautami"/>
+        <a:font script="Taml" typeface="Latha"/>
+        <a:font script="Syrc" typeface="Estrangelo Edessa"/>
+        <a:font script="Orya" typeface="Kalinga"/>
+        <a:font script="Mlym" typeface="Kartika"/>
+        <a:font script="Laoo" typeface="DokChampa"/>
+        <a:font script="Sinh" typeface="Iskoola Pota"/>
+        <a:font script="Mong" typeface="Mongolian Baiti"/>
+        <a:font script="Viet" typeface="Times New Roman"/>
+        <a:font script="Uigh" typeface="Microsoft Uighur"/>
+        <a:font script="Geor" typeface="Sylfaen"/>
+        <a:font script="Armn" typeface="Arial"/>
+        <a:font script="Bugi" typeface="Leelawadee UI"/>
+        <a:font script="Bopo" typeface="Microsoft JhengHei"/>
+        <a:font script="Java" typeface="Javanese Text"/>
+        <a:font script="Lisu" typeface="Segoe UI"/>
+        <a:font script="Mymr" typeface="Myanmar Text"/>
+        <a:font script="Nkoo" typeface="Ebrima"/>
+        <a:font script="Olck" typeface="Nirmala UI"/>
+        <a:font script="Osma" typeface="Ebrima"/>
+        <a:font script="Phag" typeface="Phagspa"/>
+        <a:font script="Syrn" typeface="Estrangelo Edessa"/>
+        <a:font script="Syrj" typeface="Estrangelo Edessa"/>
+        <a:font script="Syre" typeface="Estrangelo Edessa"/>
+        <a:font script="Sora" typeface="Nirmala UI"/>
+        <a:font script="Tale" typeface="Microsoft Tai Le"/>
+        <a:font script="Talu" typeface="Microsoft New Tai Lue"/>
+        <a:font script="Tfng" typeface="Ebrima"/>
+      </a:majorFont>
+      <a:minorFont>
+        <a:latin typeface="Calibri" panose="020F0502020204030204"/>
+        <a:ea typeface=""/>
+        <a:cs typeface=""/>
+        <a:font script="Jpan" typeface="游ゴシック"/>
+        <a:font script="Hang" typeface="맑은 고딕"/>
+        <a:font script="Hans" typeface="等线"/>
+        <a:font script="Hant" typeface="新細明體"/>
+        <a:font script="Arab" typeface="Arial"/>
         <a:font script="Hebr" typeface="Arial"/>
         <a:font script="Thai" typeface="Cordia New"/>
         <a:font script="Ethi" typeface="Nyala"/>
@@ -4622,49 +4705,29 @@
         <a:font script="Laoo" typeface="DokChampa"/>
         <a:font script="Sinh" typeface="Iskoola Pota"/>
         <a:font script="Mong" typeface="Mongolian Baiti"/>
-        <a:font script="Viet" typeface="Tahoma"/>
+        <a:font script="Viet" typeface="Arial"/>
         <a:font script="Uigh" typeface="Microsoft Uighur"/>
         <a:font script="Geor" typeface="Sylfaen"/>
-      </a:majorFont>
-      <a:minorFont>
-        <a:latin typeface="Gill Sans MT" panose="020B0502020104020203"/>
-        <a:ea typeface=""/>
-        <a:cs typeface=""/>
-        <a:font script="Grek" typeface="Corbel"/>
-        <a:font script="Cyrl" typeface="Corbel"/>
-        <a:font script="Jpan" typeface="HGｺﾞｼｯｸE"/>
-        <a:font script="Hang" typeface="휴먼매직체"/>
-        <a:font script="Hans" typeface="华文中宋"/>
-        <a:font script="Hant" typeface="微軟正黑體"/>
-        <a:font script="Arab" typeface="Majalla UI"/>
-        <a:font script="Hebr" typeface="Arial"/>
-        <a:font script="Thai" typeface="Cordia New"/>
-        <a:font script="Ethi" typeface="Nyala"/>
-        <a:font script="Beng" typeface="Vrinda"/>
-        <a:font script="Gujr" typeface="Shruti"/>
-        <a:font script="Khmr" typeface="DaunPenh"/>
-        <a:font script="Knda" typeface="Tunga"/>
-        <a:font script="Guru" typeface="Raavi"/>
-        <a:font script="Cans" typeface="Euphemia"/>
-        <a:font script="Cher" typeface="Plantagenet Cherokee"/>
-        <a:font script="Yiii" typeface="Microsoft Yi Baiti"/>
-        <a:font script="Tibt" typeface="Microsoft Himalaya"/>
-        <a:font script="Thaa" typeface="MV Boli"/>
-        <a:font script="Deva" typeface="Mangal"/>
-        <a:font script="Telu" typeface="Gautami"/>
-        <a:font script="Taml" typeface="Latha"/>
-        <a:font script="Syrc" typeface="Estrangelo Edessa"/>
-        <a:font script="Orya" typeface="Kalinga"/>
-        <a:font script="Mlym" typeface="Kartika"/>
-        <a:font script="Laoo" typeface="DokChampa"/>
-        <a:font script="Sinh" typeface="Iskoola Pota"/>
-        <a:font script="Mong" typeface="Mongolian Baiti"/>
-        <a:font script="Viet" typeface="Tahoma"/>
-        <a:font script="Uigh" typeface="Microsoft Uighur"/>
-        <a:font script="Geor" typeface="Sylfaen"/>
+        <a:font script="Armn" typeface="Arial"/>
+        <a:font script="Bugi" typeface="Leelawadee UI"/>
+        <a:font script="Bopo" typeface="Microsoft JhengHei"/>
+        <a:font script="Java" typeface="Javanese Text"/>
+        <a:font script="Lisu" typeface="Segoe UI"/>
+        <a:font script="Mymr" typeface="Myanmar Text"/>
+        <a:font script="Nkoo" typeface="Ebrima"/>
+        <a:font script="Olck" typeface="Nirmala UI"/>
+        <a:font script="Osma" typeface="Ebrima"/>
+        <a:font script="Phag" typeface="Phagspa"/>
+        <a:font script="Syrn" typeface="Estrangelo Edessa"/>
+        <a:font script="Syrj" typeface="Estrangelo Edessa"/>
+        <a:font script="Syre" typeface="Estrangelo Edessa"/>
+        <a:font script="Sora" typeface="Nirmala UI"/>
+        <a:font script="Tale" typeface="Microsoft Tai Le"/>
+        <a:font script="Talu" typeface="Microsoft New Tai Lue"/>
+        <a:font script="Tfng" typeface="Ebrima"/>
       </a:minorFont>
     </a:fontScheme>
-    <a:fmtScheme name="Parcel">
+    <a:fmtScheme name="Office">
       <a:fillStyleLst>
         <a:solidFill>
           <a:schemeClr val="phClr"/>
@@ -4673,16 +4736,23 @@
           <a:gsLst>
             <a:gs pos="0">
               <a:schemeClr val="phClr">
-                <a:tint val="80000"/>
-                <a:satMod val="107000"/>
-                <a:lumMod val="103000"/>
+                <a:lumMod val="110000"/>
+                <a:satMod val="105000"/>
+                <a:tint val="67000"/>
+              </a:schemeClr>
+            </a:gs>
+            <a:gs pos="50000">
+              <a:schemeClr val="phClr">
+                <a:lumMod val="105000"/>
+                <a:satMod val="103000"/>
+                <a:tint val="73000"/>
               </a:schemeClr>
             </a:gs>
             <a:gs pos="100000">
               <a:schemeClr val="phClr">
-                <a:tint val="82000"/>
+                <a:lumMod val="105000"/>
                 <a:satMod val="109000"/>
-                <a:lumMod val="103000"/>
+                <a:tint val="81000"/>
               </a:schemeClr>
             </a:gs>
           </a:gsLst>
@@ -4692,23 +4762,23 @@
           <a:gsLst>
             <a:gs pos="0">
               <a:schemeClr val="phClr">
-                <a:tint val="97000"/>
-                <a:satMod val="100000"/>
+                <a:satMod val="103000"/>
                 <a:lumMod val="102000"/>
+                <a:tint val="94000"/>
               </a:schemeClr>
             </a:gs>
             <a:gs pos="50000">
               <a:schemeClr val="phClr">
+                <a:satMod val="110000"/>
+                <a:lumMod val="100000"/>
                 <a:shade val="100000"/>
-                <a:satMod val="103000"/>
-                <a:lumMod val="100000"/>
               </a:schemeClr>
             </a:gs>
             <a:gs pos="100000">
               <a:schemeClr val="phClr">
-                <a:shade val="93000"/>
-                <a:satMod val="110000"/>
                 <a:lumMod val="99000"/>
+                <a:satMod val="120000"/>
+                <a:shade val="78000"/>
               </a:schemeClr>
             </a:gs>
           </a:gsLst>
@@ -4721,18 +4791,21 @@
             <a:schemeClr val="phClr"/>
           </a:solidFill>
           <a:prstDash val="solid"/>
+          <a:miter lim="800000"/>
         </a:ln>
         <a:ln w="12700" cap="flat" cmpd="sng" algn="ctr">
           <a:solidFill>
             <a:schemeClr val="phClr"/>
           </a:solidFill>
           <a:prstDash val="solid"/>
+          <a:miter lim="800000"/>
         </a:ln>
-        <a:ln w="31750" cap="flat" cmpd="sng" algn="ctr">
+        <a:ln w="19050" cap="flat" cmpd="sng" algn="ctr">
           <a:solidFill>
             <a:schemeClr val="phClr"/>
           </a:solidFill>
           <a:prstDash val="solid"/>
+          <a:miter lim="800000"/>
         </a:ln>
       </a:lnStyleLst>
       <a:effectStyleLst>
@@ -4744,21 +4817,12 @@
         </a:effectStyle>
         <a:effectStyle>
           <a:effectLst>
-            <a:outerShdw blurRad="55880" dist="15240" dir="5400000" algn="ctr" rotWithShape="0">
+            <a:outerShdw blurRad="57150" dist="19050" dir="5400000" algn="ctr" rotWithShape="0">
               <a:srgbClr val="000000">
-                <a:alpha val="45000"/>
+                <a:alpha val="63000"/>
               </a:srgbClr>
             </a:outerShdw>
           </a:effectLst>
-          <a:scene3d>
-            <a:camera prst="orthographicFront">
-              <a:rot lat="0" lon="0" rev="0"/>
-            </a:camera>
-            <a:lightRig rig="brightRoom" dir="tl"/>
-          </a:scene3d>
-          <a:sp3d prstMaterial="dkEdge">
-            <a:bevelT w="0" h="0"/>
-          </a:sp3d>
         </a:effectStyle>
       </a:effectStyleLst>
       <a:bgFillStyleLst>
@@ -4775,24 +4839,28 @@
           <a:gsLst>
             <a:gs pos="0">
               <a:schemeClr val="phClr">
-                <a:tint val="97000"/>
-                <a:shade val="100000"/>
-                <a:satMod val="185000"/>
-                <a:lumMod val="120000"/>
+                <a:tint val="93000"/>
+                <a:satMod val="150000"/>
+                <a:shade val="98000"/>
+                <a:lumMod val="102000"/>
+              </a:schemeClr>
+            </a:gs>
+            <a:gs pos="50000">
+              <a:schemeClr val="phClr">
+                <a:tint val="98000"/>
+                <a:satMod val="130000"/>
+                <a:shade val="90000"/>
+                <a:lumMod val="103000"/>
               </a:schemeClr>
             </a:gs>
             <a:gs pos="100000">
               <a:schemeClr val="phClr">
-                <a:tint val="96000"/>
-                <a:shade val="95000"/>
-                <a:satMod val="215000"/>
-                <a:lumMod val="80000"/>
+                <a:shade val="63000"/>
+                <a:satMod val="120000"/>
               </a:schemeClr>
             </a:gs>
           </a:gsLst>
-          <a:path path="circle">
-            <a:fillToRect l="50000" t="55000" r="125000" b="100000"/>
-          </a:path>
+          <a:lin ang="5400000" scaled="0"/>
         </a:gradFill>
       </a:bgFillStyleLst>
     </a:fmtScheme>
@@ -4801,7 +4869,7 @@
   <a:extraClrSchemeLst/>
   <a:extLst>
     <a:ext uri="{05A4C25C-085E-4340-85A3-A5531E510DB2}">
-      <thm15:themeFamily xmlns:thm15="http://schemas.microsoft.com/office/thememl/2012/main" name="Parcel" id="{8BEC4385-4EB9-4D53-BFB5-0EA123736B6D}" vid="{4DB32801-28C0-48B0-8C1D-A9A58613615A}"/>
+      <thm15:themeFamily xmlns:thm15="http://schemas.microsoft.com/office/thememl/2012/main" name="Office Theme" id="{62F939B6-93AF-4DB8-9C6B-D6C7DFDC589F}" vid="{4A3C46E8-61CC-4603-A589-7422A47A8E4A}"/>
     </a:ext>
   </a:extLst>
 </a:theme>

</xml_diff>